<commit_message>
Fix a part of a doc. Need more fix.
</commit_message>
<xml_diff>
--- a/Submission/PETCARE-v4.pptx
+++ b/Submission/PETCARE-v4.pptx
@@ -5,21 +5,21 @@
     <p:sldMasterId id="2147483648" r:id="rId1"/>
   </p:sldMasterIdLst>
   <p:sldIdLst>
-    <p:sldId id="256" r:id="rId2"/>
-    <p:sldId id="257" r:id="rId3"/>
-    <p:sldId id="258" r:id="rId4"/>
-    <p:sldId id="259" r:id="rId5"/>
-    <p:sldId id="261" r:id="rId6"/>
-    <p:sldId id="272" r:id="rId7"/>
-    <p:sldId id="274" r:id="rId8"/>
-    <p:sldId id="275" r:id="rId9"/>
-    <p:sldId id="276" r:id="rId10"/>
-    <p:sldId id="273" r:id="rId11"/>
-    <p:sldId id="267" r:id="rId12"/>
-    <p:sldId id="269" r:id="rId13"/>
-    <p:sldId id="270" r:id="rId14"/>
-    <p:sldId id="271" r:id="rId15"/>
-    <p:sldId id="268" r:id="rId16"/>
+    <p:sldId id="256" r:id="rId3"/>
+    <p:sldId id="257" r:id="rId4"/>
+    <p:sldId id="258" r:id="rId5"/>
+    <p:sldId id="259" r:id="rId6"/>
+    <p:sldId id="261" r:id="rId7"/>
+    <p:sldId id="272" r:id="rId8"/>
+    <p:sldId id="274" r:id="rId9"/>
+    <p:sldId id="275" r:id="rId10"/>
+    <p:sldId id="276" r:id="rId11"/>
+    <p:sldId id="273" r:id="rId12"/>
+    <p:sldId id="267" r:id="rId13"/>
+    <p:sldId id="269" r:id="rId14"/>
+    <p:sldId id="270" r:id="rId15"/>
+    <p:sldId id="271" r:id="rId16"/>
+    <p:sldId id="268" r:id="rId17"/>
   </p:sldIdLst>
   <p:sldSz cx="12192000" cy="6858000"/>
   <p:notesSz cx="6858000" cy="9144000"/>
@@ -118,16 +118,11 @@
       </a:defRPr>
     </a:lvl9pPr>
   </p:defaultTextStyle>
-  <p:extLst>
-    <p:ext uri="{EFAFB233-063F-42B5-8137-9DF3F51BA10A}">
-      <p15:sldGuideLst xmlns:p15="http://schemas.microsoft.com/office/powerpoint/2012/main"/>
-    </p:ext>
-  </p:extLst>
 </p:presentation>
 </file>
 
 <file path=ppt/slideLayouts/slideLayout1.xml><?xml version="1.0" encoding="utf-8"?>
-<p:sldLayout xmlns:a="http://schemas.openxmlformats.org/drawingml/2006/main" xmlns:r="http://schemas.openxmlformats.org/officeDocument/2006/relationships" xmlns:p="http://schemas.openxmlformats.org/presentationml/2006/main" showMasterSp="0" type="title" preserve="1">
+<p:sldLayout xmlns:a="http://schemas.openxmlformats.org/drawingml/2006/main" xmlns:r="http://schemas.openxmlformats.org/officeDocument/2006/relationships" xmlns:p="http://schemas.openxmlformats.org/presentationml/2006/main" type="title" preserve="1" showMasterSp="0">
   <p:cSld name="Title Slide">
     <p:bg>
       <p:bgPr>
@@ -295,8 +290,6 @@
           <a:p>
             <a:fld id="{87DE6118-2437-4B30-8E3C-4D2BE6020583}" type="datetimeFigureOut">
               <a:rPr lang="en-US" dirty="0"/>
-              <a:pPr/>
-              <a:t>6/3/2021</a:t>
             </a:fld>
             <a:endParaRPr lang="en-US" dirty="0"/>
           </a:p>
@@ -364,8 +357,6 @@
           <a:p>
             <a:fld id="{69E57DC2-970A-4B3E-BB1C-7A09969E49DF}" type="slidenum">
               <a:rPr lang="en-US" dirty="0"/>
-              <a:pPr/>
-              <a:t>‹#›</a:t>
             </a:fld>
             <a:endParaRPr lang="en-US" dirty="0"/>
           </a:p>
@@ -436,8 +427,6 @@
               <a:noFill/>
               <a:prstDash val="solid"/>
               <a:round/>
-              <a:headEnd/>
-              <a:tailEnd/>
             </a:ln>
           </p:spPr>
         </p:sp>
@@ -494,8 +483,6 @@
               <a:noFill/>
               <a:prstDash val="solid"/>
               <a:round/>
-              <a:headEnd/>
-              <a:tailEnd/>
             </a:ln>
           </p:spPr>
         </p:sp>
@@ -573,6 +560,7 @@
               <a:rPr lang="en-US"/>
               <a:t>Click to edit Master text styles</a:t>
             </a:r>
+            <a:endParaRPr lang="en-US"/>
           </a:p>
           <a:p>
             <a:pPr lvl="1"/>
@@ -580,6 +568,7 @@
               <a:rPr lang="en-US"/>
               <a:t>Second level</a:t>
             </a:r>
+            <a:endParaRPr lang="en-US"/>
           </a:p>
           <a:p>
             <a:pPr lvl="2"/>
@@ -587,6 +576,7 @@
               <a:rPr lang="en-US"/>
               <a:t>Third level</a:t>
             </a:r>
+            <a:endParaRPr lang="en-US"/>
           </a:p>
           <a:p>
             <a:pPr lvl="3"/>
@@ -594,6 +584,7 @@
               <a:rPr lang="en-US"/>
               <a:t>Fourth level</a:t>
             </a:r>
+            <a:endParaRPr lang="en-US"/>
           </a:p>
           <a:p>
             <a:pPr lvl="4"/>
@@ -622,7 +613,6 @@
           <a:p>
             <a:fld id="{87DE6118-2437-4B30-8E3C-4D2BE6020583}" type="datetimeFigureOut">
               <a:rPr lang="en-US" dirty="0"/>
-              <a:t>6/3/2021</a:t>
             </a:fld>
             <a:endParaRPr lang="en-US" dirty="0"/>
           </a:p>
@@ -664,7 +654,6 @@
           <a:p>
             <a:fld id="{69E57DC2-970A-4B3E-BB1C-7A09969E49DF}" type="slidenum">
               <a:rPr lang="en-US" dirty="0"/>
-              <a:t>‹#›</a:t>
             </a:fld>
             <a:endParaRPr lang="en-US" dirty="0"/>
           </a:p>
@@ -748,6 +737,7 @@
               <a:rPr lang="en-US"/>
               <a:t>Click to edit Master text styles</a:t>
             </a:r>
+            <a:endParaRPr lang="en-US"/>
           </a:p>
           <a:p>
             <a:pPr lvl="1"/>
@@ -755,6 +745,7 @@
               <a:rPr lang="en-US"/>
               <a:t>Second level</a:t>
             </a:r>
+            <a:endParaRPr lang="en-US"/>
           </a:p>
           <a:p>
             <a:pPr lvl="2"/>
@@ -762,6 +753,7 @@
               <a:rPr lang="en-US"/>
               <a:t>Third level</a:t>
             </a:r>
+            <a:endParaRPr lang="en-US"/>
           </a:p>
           <a:p>
             <a:pPr lvl="3"/>
@@ -769,6 +761,7 @@
               <a:rPr lang="en-US"/>
               <a:t>Fourth level</a:t>
             </a:r>
+            <a:endParaRPr lang="en-US"/>
           </a:p>
           <a:p>
             <a:pPr lvl="4"/>
@@ -797,7 +790,6 @@
           <a:p>
             <a:fld id="{87DE6118-2437-4B30-8E3C-4D2BE6020583}" type="datetimeFigureOut">
               <a:rPr lang="en-US" dirty="0"/>
-              <a:t>6/3/2021</a:t>
             </a:fld>
             <a:endParaRPr lang="en-US" dirty="0"/>
           </a:p>
@@ -839,7 +831,6 @@
           <a:p>
             <a:fld id="{69E57DC2-970A-4B3E-BB1C-7A09969E49DF}" type="slidenum">
               <a:rPr lang="en-US" dirty="0"/>
-              <a:t>‹#›</a:t>
             </a:fld>
             <a:endParaRPr lang="en-US" dirty="0"/>
           </a:p>
@@ -913,6 +904,7 @@
               <a:rPr lang="en-US"/>
               <a:t>Click to edit Master text styles</a:t>
             </a:r>
+            <a:endParaRPr lang="en-US"/>
           </a:p>
           <a:p>
             <a:pPr lvl="1"/>
@@ -920,6 +912,7 @@
               <a:rPr lang="en-US"/>
               <a:t>Second level</a:t>
             </a:r>
+            <a:endParaRPr lang="en-US"/>
           </a:p>
           <a:p>
             <a:pPr lvl="2"/>
@@ -927,6 +920,7 @@
               <a:rPr lang="en-US"/>
               <a:t>Third level</a:t>
             </a:r>
+            <a:endParaRPr lang="en-US"/>
           </a:p>
           <a:p>
             <a:pPr lvl="3"/>
@@ -934,6 +928,7 @@
               <a:rPr lang="en-US"/>
               <a:t>Fourth level</a:t>
             </a:r>
+            <a:endParaRPr lang="en-US"/>
           </a:p>
           <a:p>
             <a:pPr lvl="4"/>
@@ -962,7 +957,6 @@
           <a:p>
             <a:fld id="{87DE6118-2437-4B30-8E3C-4D2BE6020583}" type="datetimeFigureOut">
               <a:rPr lang="en-US" dirty="0"/>
-              <a:t>6/3/2021</a:t>
             </a:fld>
             <a:endParaRPr lang="en-US" dirty="0"/>
           </a:p>
@@ -1004,7 +998,6 @@
           <a:p>
             <a:fld id="{69E57DC2-970A-4B3E-BB1C-7A09969E49DF}" type="slidenum">
               <a:rPr lang="en-US" dirty="0"/>
-              <a:t>‹#›</a:t>
             </a:fld>
             <a:endParaRPr lang="en-US" dirty="0"/>
           </a:p>
@@ -1019,7 +1012,7 @@
 </file>
 
 <file path=ppt/slideLayouts/slideLayout3.xml><?xml version="1.0" encoding="utf-8"?>
-<p:sldLayout xmlns:a="http://schemas.openxmlformats.org/drawingml/2006/main" xmlns:r="http://schemas.openxmlformats.org/officeDocument/2006/relationships" xmlns:p="http://schemas.openxmlformats.org/presentationml/2006/main" showMasterSp="0" type="secHead" preserve="1">
+<p:sldLayout xmlns:a="http://schemas.openxmlformats.org/drawingml/2006/main" xmlns:r="http://schemas.openxmlformats.org/officeDocument/2006/relationships" xmlns:p="http://schemas.openxmlformats.org/presentationml/2006/main" type="secHead" preserve="1" showMasterSp="0">
   <p:cSld name="Section Header">
     <p:bg>
       <p:bgRef idx="1001">
@@ -1201,6 +1194,7 @@
               <a:rPr lang="en-US"/>
               <a:t>Click to edit Master text styles</a:t>
             </a:r>
+            <a:endParaRPr lang="en-US"/>
           </a:p>
         </p:txBody>
       </p:sp>
@@ -1234,8 +1228,6 @@
           <a:p>
             <a:fld id="{87DE6118-2437-4B30-8E3C-4D2BE6020583}" type="datetimeFigureOut">
               <a:rPr lang="en-US" dirty="0"/>
-              <a:pPr/>
-              <a:t>6/3/2021</a:t>
             </a:fld>
             <a:endParaRPr lang="en-US" dirty="0"/>
           </a:p>
@@ -1303,8 +1295,6 @@
           <a:p>
             <a:fld id="{69E57DC2-970A-4B3E-BB1C-7A09969E49DF}" type="slidenum">
               <a:rPr lang="en-US" dirty="0"/>
-              <a:pPr/>
-              <a:t>‹#›</a:t>
             </a:fld>
             <a:endParaRPr lang="en-US" dirty="0"/>
           </a:p>
@@ -1361,8 +1351,6 @@
             <a:noFill/>
             <a:prstDash val="solid"/>
             <a:round/>
-            <a:headEnd/>
-            <a:tailEnd/>
           </a:ln>
         </p:spPr>
       </p:sp>
@@ -1483,6 +1471,7 @@
               <a:rPr lang="en-US"/>
               <a:t>Click to edit Master text styles</a:t>
             </a:r>
+            <a:endParaRPr lang="en-US"/>
           </a:p>
           <a:p>
             <a:pPr lvl="1"/>
@@ -1490,6 +1479,7 @@
               <a:rPr lang="en-US"/>
               <a:t>Second level</a:t>
             </a:r>
+            <a:endParaRPr lang="en-US"/>
           </a:p>
           <a:p>
             <a:pPr lvl="2"/>
@@ -1497,6 +1487,7 @@
               <a:rPr lang="en-US"/>
               <a:t>Third level</a:t>
             </a:r>
+            <a:endParaRPr lang="en-US"/>
           </a:p>
           <a:p>
             <a:pPr lvl="3"/>
@@ -1504,6 +1495,7 @@
               <a:rPr lang="en-US"/>
               <a:t>Fourth level</a:t>
             </a:r>
+            <a:endParaRPr lang="en-US"/>
           </a:p>
           <a:p>
             <a:pPr lvl="4"/>
@@ -1576,6 +1568,7 @@
               <a:rPr lang="en-US"/>
               <a:t>Click to edit Master text styles</a:t>
             </a:r>
+            <a:endParaRPr lang="en-US"/>
           </a:p>
           <a:p>
             <a:pPr lvl="1"/>
@@ -1583,6 +1576,7 @@
               <a:rPr lang="en-US"/>
               <a:t>Second level</a:t>
             </a:r>
+            <a:endParaRPr lang="en-US"/>
           </a:p>
           <a:p>
             <a:pPr lvl="2"/>
@@ -1590,6 +1584,7 @@
               <a:rPr lang="en-US"/>
               <a:t>Third level</a:t>
             </a:r>
+            <a:endParaRPr lang="en-US"/>
           </a:p>
           <a:p>
             <a:pPr lvl="3"/>
@@ -1597,6 +1592,7 @@
               <a:rPr lang="en-US"/>
               <a:t>Fourth level</a:t>
             </a:r>
+            <a:endParaRPr lang="en-US"/>
           </a:p>
           <a:p>
             <a:pPr lvl="4"/>
@@ -1625,7 +1621,6 @@
           <a:p>
             <a:fld id="{87DE6118-2437-4B30-8E3C-4D2BE6020583}" type="datetimeFigureOut">
               <a:rPr lang="en-US" dirty="0"/>
-              <a:t>6/3/2021</a:t>
             </a:fld>
             <a:endParaRPr lang="en-US" dirty="0"/>
           </a:p>
@@ -1667,7 +1662,6 @@
           <a:p>
             <a:fld id="{69E57DC2-970A-4B3E-BB1C-7A09969E49DF}" type="slidenum">
               <a:rPr lang="en-US" dirty="0"/>
-              <a:t>‹#›</a:t>
             </a:fld>
             <a:endParaRPr lang="en-US" dirty="0"/>
           </a:p>
@@ -1811,6 +1805,7 @@
               <a:rPr lang="en-US"/>
               <a:t>Click to edit Master text styles</a:t>
             </a:r>
+            <a:endParaRPr lang="en-US"/>
           </a:p>
         </p:txBody>
       </p:sp>
@@ -1875,6 +1870,7 @@
               <a:rPr lang="en-US"/>
               <a:t>Click to edit Master text styles</a:t>
             </a:r>
+            <a:endParaRPr lang="en-US"/>
           </a:p>
           <a:p>
             <a:pPr lvl="1"/>
@@ -1882,6 +1878,7 @@
               <a:rPr lang="en-US"/>
               <a:t>Second level</a:t>
             </a:r>
+            <a:endParaRPr lang="en-US"/>
           </a:p>
           <a:p>
             <a:pPr lvl="2"/>
@@ -1889,6 +1886,7 @@
               <a:rPr lang="en-US"/>
               <a:t>Third level</a:t>
             </a:r>
+            <a:endParaRPr lang="en-US"/>
           </a:p>
           <a:p>
             <a:pPr lvl="3"/>
@@ -1896,6 +1894,7 @@
               <a:rPr lang="en-US"/>
               <a:t>Fourth level</a:t>
             </a:r>
+            <a:endParaRPr lang="en-US"/>
           </a:p>
           <a:p>
             <a:pPr lvl="4"/>
@@ -1984,6 +1983,7 @@
               <a:rPr lang="en-US"/>
               <a:t>Click to edit Master text styles</a:t>
             </a:r>
+            <a:endParaRPr lang="en-US"/>
           </a:p>
         </p:txBody>
       </p:sp>
@@ -2048,6 +2048,7 @@
               <a:rPr lang="en-US"/>
               <a:t>Click to edit Master text styles</a:t>
             </a:r>
+            <a:endParaRPr lang="en-US"/>
           </a:p>
           <a:p>
             <a:pPr lvl="1"/>
@@ -2055,6 +2056,7 @@
               <a:rPr lang="en-US"/>
               <a:t>Second level</a:t>
             </a:r>
+            <a:endParaRPr lang="en-US"/>
           </a:p>
           <a:p>
             <a:pPr lvl="2"/>
@@ -2062,6 +2064,7 @@
               <a:rPr lang="en-US"/>
               <a:t>Third level</a:t>
             </a:r>
+            <a:endParaRPr lang="en-US"/>
           </a:p>
           <a:p>
             <a:pPr lvl="3"/>
@@ -2069,6 +2072,7 @@
               <a:rPr lang="en-US"/>
               <a:t>Fourth level</a:t>
             </a:r>
+            <a:endParaRPr lang="en-US"/>
           </a:p>
           <a:p>
             <a:pPr lvl="4"/>
@@ -2097,7 +2101,6 @@
           <a:p>
             <a:fld id="{87DE6118-2437-4B30-8E3C-4D2BE6020583}" type="datetimeFigureOut">
               <a:rPr lang="en-US" dirty="0"/>
-              <a:t>6/3/2021</a:t>
             </a:fld>
             <a:endParaRPr lang="en-US" dirty="0"/>
           </a:p>
@@ -2139,7 +2142,6 @@
           <a:p>
             <a:fld id="{69E57DC2-970A-4B3E-BB1C-7A09969E49DF}" type="slidenum">
               <a:rPr lang="en-US" dirty="0"/>
-              <a:t>‹#›</a:t>
             </a:fld>
             <a:endParaRPr lang="en-US" dirty="0"/>
           </a:p>
@@ -2210,7 +2212,6 @@
           <a:p>
             <a:fld id="{87DE6118-2437-4B30-8E3C-4D2BE6020583}" type="datetimeFigureOut">
               <a:rPr lang="en-US" dirty="0"/>
-              <a:t>6/3/2021</a:t>
             </a:fld>
             <a:endParaRPr lang="en-US" dirty="0"/>
           </a:p>
@@ -2252,7 +2253,6 @@
           <a:p>
             <a:fld id="{69E57DC2-970A-4B3E-BB1C-7A09969E49DF}" type="slidenum">
               <a:rPr lang="en-US" dirty="0"/>
-              <a:t>‹#›</a:t>
             </a:fld>
             <a:endParaRPr lang="en-US" dirty="0"/>
           </a:p>
@@ -2300,7 +2300,6 @@
           <a:p>
             <a:fld id="{87DE6118-2437-4B30-8E3C-4D2BE6020583}" type="datetimeFigureOut">
               <a:rPr lang="en-US" dirty="0"/>
-              <a:t>6/3/2021</a:t>
             </a:fld>
             <a:endParaRPr lang="en-US" dirty="0"/>
           </a:p>
@@ -2342,7 +2341,6 @@
           <a:p>
             <a:fld id="{69E57DC2-970A-4B3E-BB1C-7A09969E49DF}" type="slidenum">
               <a:rPr lang="en-US" dirty="0"/>
-              <a:t>‹#›</a:t>
             </a:fld>
             <a:endParaRPr lang="en-US" dirty="0"/>
           </a:p>
@@ -2357,7 +2355,7 @@
 </file>
 
 <file path=ppt/slideLayouts/slideLayout8.xml><?xml version="1.0" encoding="utf-8"?>
-<p:sldLayout xmlns:a="http://schemas.openxmlformats.org/drawingml/2006/main" xmlns:r="http://schemas.openxmlformats.org/officeDocument/2006/relationships" xmlns:p="http://schemas.openxmlformats.org/presentationml/2006/main" showMasterSp="0" type="objTx" preserve="1">
+<p:sldLayout xmlns:a="http://schemas.openxmlformats.org/drawingml/2006/main" xmlns:r="http://schemas.openxmlformats.org/officeDocument/2006/relationships" xmlns:p="http://schemas.openxmlformats.org/presentationml/2006/main" type="objTx" preserve="1" showMasterSp="0">
   <p:cSld name="Content with Caption">
     <p:spTree>
       <p:nvGrpSpPr>
@@ -2505,6 +2503,7 @@
               <a:rPr lang="en-US"/>
               <a:t>Click to edit Master text styles</a:t>
             </a:r>
+            <a:endParaRPr lang="en-US"/>
           </a:p>
           <a:p>
             <a:pPr lvl="1"/>
@@ -2512,6 +2511,7 @@
               <a:rPr lang="en-US"/>
               <a:t>Second level</a:t>
             </a:r>
+            <a:endParaRPr lang="en-US"/>
           </a:p>
           <a:p>
             <a:pPr lvl="2"/>
@@ -2519,6 +2519,7 @@
               <a:rPr lang="en-US"/>
               <a:t>Third level</a:t>
             </a:r>
+            <a:endParaRPr lang="en-US"/>
           </a:p>
           <a:p>
             <a:pPr lvl="3"/>
@@ -2526,6 +2527,7 @@
               <a:rPr lang="en-US"/>
               <a:t>Fourth level</a:t>
             </a:r>
+            <a:endParaRPr lang="en-US"/>
           </a:p>
           <a:p>
             <a:pPr lvl="4"/>
@@ -2608,6 +2610,7 @@
               <a:rPr lang="en-US"/>
               <a:t>Click to edit Master text styles</a:t>
             </a:r>
+            <a:endParaRPr lang="en-US"/>
           </a:p>
         </p:txBody>
       </p:sp>
@@ -2641,8 +2644,6 @@
           <a:p>
             <a:fld id="{87DE6118-2437-4B30-8E3C-4D2BE6020583}" type="datetimeFigureOut">
               <a:rPr lang="en-US" dirty="0"/>
-              <a:pPr/>
-              <a:t>6/3/2021</a:t>
             </a:fld>
             <a:endParaRPr lang="en-US" dirty="0"/>
           </a:p>
@@ -2710,8 +2711,6 @@
           <a:p>
             <a:fld id="{69E57DC2-970A-4B3E-BB1C-7A09969E49DF}" type="slidenum">
               <a:rPr lang="en-US" dirty="0"/>
-              <a:pPr/>
-              <a:t>‹#›</a:t>
             </a:fld>
             <a:endParaRPr lang="en-US" dirty="0"/>
           </a:p>
@@ -2764,7 +2763,7 @@
 </file>
 
 <file path=ppt/slideLayouts/slideLayout9.xml><?xml version="1.0" encoding="utf-8"?>
-<p:sldLayout xmlns:a="http://schemas.openxmlformats.org/drawingml/2006/main" xmlns:r="http://schemas.openxmlformats.org/officeDocument/2006/relationships" xmlns:p="http://schemas.openxmlformats.org/presentationml/2006/main" showMasterSp="0" type="picTx" preserve="1">
+<p:sldLayout xmlns:a="http://schemas.openxmlformats.org/drawingml/2006/main" xmlns:r="http://schemas.openxmlformats.org/officeDocument/2006/relationships" xmlns:p="http://schemas.openxmlformats.org/presentationml/2006/main" type="picTx" preserve="1" showMasterSp="0">
   <p:cSld name="Picture with Caption">
     <p:spTree>
       <p:nvGrpSpPr>
@@ -2993,6 +2992,7 @@
               <a:rPr lang="en-US"/>
               <a:t>Click to edit Master text styles</a:t>
             </a:r>
+            <a:endParaRPr lang="en-US"/>
           </a:p>
         </p:txBody>
       </p:sp>
@@ -3026,8 +3026,6 @@
           <a:p>
             <a:fld id="{87DE6118-2437-4B30-8E3C-4D2BE6020583}" type="datetimeFigureOut">
               <a:rPr lang="en-US" dirty="0"/>
-              <a:pPr/>
-              <a:t>6/3/2021</a:t>
             </a:fld>
             <a:endParaRPr lang="en-US" dirty="0"/>
           </a:p>
@@ -3095,8 +3093,6 @@
           <a:p>
             <a:fld id="{69E57DC2-970A-4B3E-BB1C-7A09969E49DF}" type="slidenum">
               <a:rPr lang="en-US" dirty="0"/>
-              <a:pPr/>
-              <a:t>‹#›</a:t>
             </a:fld>
             <a:endParaRPr lang="en-US" dirty="0"/>
           </a:p>
@@ -3236,6 +3232,7 @@
               <a:rPr lang="en-US"/>
               <a:t>Click to edit Master text styles</a:t>
             </a:r>
+            <a:endParaRPr lang="en-US"/>
           </a:p>
           <a:p>
             <a:pPr lvl="1"/>
@@ -3243,6 +3240,7 @@
               <a:rPr lang="en-US"/>
               <a:t>Second level</a:t>
             </a:r>
+            <a:endParaRPr lang="en-US"/>
           </a:p>
           <a:p>
             <a:pPr lvl="2"/>
@@ -3250,6 +3248,7 @@
               <a:rPr lang="en-US"/>
               <a:t>Third level</a:t>
             </a:r>
+            <a:endParaRPr lang="en-US"/>
           </a:p>
           <a:p>
             <a:pPr lvl="3"/>
@@ -3257,6 +3256,7 @@
               <a:rPr lang="en-US"/>
               <a:t>Fourth level</a:t>
             </a:r>
+            <a:endParaRPr lang="en-US"/>
           </a:p>
           <a:p>
             <a:pPr lvl="4"/>
@@ -3301,8 +3301,6 @@
           <a:p>
             <a:fld id="{87DE6118-2437-4B30-8E3C-4D2BE6020583}" type="datetimeFigureOut">
               <a:rPr lang="en-US" dirty="0"/>
-              <a:pPr/>
-              <a:t>6/3/2021</a:t>
             </a:fld>
             <a:endParaRPr lang="en-US" dirty="0"/>
           </a:p>
@@ -3376,8 +3374,6 @@
           <a:p>
             <a:fld id="{69E57DC2-970A-4B3E-BB1C-7A09969E49DF}" type="slidenum">
               <a:rPr lang="en-US" dirty="0"/>
-              <a:pPr/>
-              <a:t>‹#›</a:t>
             </a:fld>
             <a:endParaRPr lang="en-US" dirty="0"/>
           </a:p>
@@ -3458,7 +3454,7 @@
       </a:lvl1pPr>
     </p:titleStyle>
     <p:bodyStyle>
-      <a:lvl1pPr marL="384048" indent="-384048" algn="l" defTabSz="914400" rtl="0" eaLnBrk="1" latinLnBrk="0" hangingPunct="1">
+      <a:lvl1pPr marL="384175" indent="-384175" algn="l" defTabSz="914400" rtl="0" eaLnBrk="1" latinLnBrk="0" hangingPunct="1">
         <a:lnSpc>
           <a:spcPct val="94000"/>
         </a:lnSpc>
@@ -3479,7 +3475,7 @@
           <a:cs typeface="+mn-cs"/>
         </a:defRPr>
       </a:lvl1pPr>
-      <a:lvl2pPr marL="914400" indent="-384048" algn="l" defTabSz="914400" rtl="0" eaLnBrk="1" latinLnBrk="0" hangingPunct="1">
+      <a:lvl2pPr marL="914400" indent="-384175" algn="l" defTabSz="914400" rtl="0" eaLnBrk="1" latinLnBrk="0" hangingPunct="1">
         <a:lnSpc>
           <a:spcPct val="94000"/>
         </a:lnSpc>
@@ -3500,7 +3496,7 @@
           <a:cs typeface="+mn-cs"/>
         </a:defRPr>
       </a:lvl2pPr>
-      <a:lvl3pPr marL="1371600" indent="-384048" algn="l" defTabSz="914400" rtl="0" eaLnBrk="1" latinLnBrk="0" hangingPunct="1">
+      <a:lvl3pPr marL="1371600" indent="-384175" algn="l" defTabSz="914400" rtl="0" eaLnBrk="1" latinLnBrk="0" hangingPunct="1">
         <a:lnSpc>
           <a:spcPct val="94000"/>
         </a:lnSpc>
@@ -3521,7 +3517,7 @@
           <a:cs typeface="+mn-cs"/>
         </a:defRPr>
       </a:lvl3pPr>
-      <a:lvl4pPr marL="1828800" indent="-384048" algn="l" defTabSz="914400" rtl="0" eaLnBrk="1" latinLnBrk="0" hangingPunct="1">
+      <a:lvl4pPr marL="1828800" indent="-384175" algn="l" defTabSz="914400" rtl="0" eaLnBrk="1" latinLnBrk="0" hangingPunct="1">
         <a:lnSpc>
           <a:spcPct val="94000"/>
         </a:lnSpc>
@@ -3542,7 +3538,7 @@
           <a:cs typeface="+mn-cs"/>
         </a:defRPr>
       </a:lvl4pPr>
-      <a:lvl5pPr marL="2286000" indent="-384048" algn="l" defTabSz="914400" rtl="0" eaLnBrk="1" latinLnBrk="0" hangingPunct="1">
+      <a:lvl5pPr marL="2286000" indent="-384175" algn="l" defTabSz="914400" rtl="0" eaLnBrk="1" latinLnBrk="0" hangingPunct="1">
         <a:lnSpc>
           <a:spcPct val="94000"/>
         </a:lnSpc>
@@ -3563,7 +3559,7 @@
           <a:cs typeface="+mn-cs"/>
         </a:defRPr>
       </a:lvl5pPr>
-      <a:lvl6pPr marL="2743200" indent="-384048" algn="l" defTabSz="914400" rtl="0" eaLnBrk="1" latinLnBrk="0" hangingPunct="1">
+      <a:lvl6pPr marL="2743200" indent="-384175" algn="l" defTabSz="914400" rtl="0" eaLnBrk="1" latinLnBrk="0" hangingPunct="1">
         <a:lnSpc>
           <a:spcPct val="94000"/>
         </a:lnSpc>
@@ -3584,7 +3580,7 @@
           <a:cs typeface="+mn-cs"/>
         </a:defRPr>
       </a:lvl6pPr>
-      <a:lvl7pPr marL="3200400" indent="-384048" algn="l" defTabSz="914400" rtl="0" eaLnBrk="1" latinLnBrk="0" hangingPunct="1">
+      <a:lvl7pPr marL="3200400" indent="-384175" algn="l" defTabSz="914400" rtl="0" eaLnBrk="1" latinLnBrk="0" hangingPunct="1">
         <a:lnSpc>
           <a:spcPct val="94000"/>
         </a:lnSpc>
@@ -3605,7 +3601,7 @@
           <a:cs typeface="+mn-cs"/>
         </a:defRPr>
       </a:lvl7pPr>
-      <a:lvl8pPr marL="3657600" indent="-384048" algn="l" defTabSz="914400" rtl="0" eaLnBrk="1" latinLnBrk="0" hangingPunct="1">
+      <a:lvl8pPr marL="3657600" indent="-384175" algn="l" defTabSz="914400" rtl="0" eaLnBrk="1" latinLnBrk="0" hangingPunct="1">
         <a:lnSpc>
           <a:spcPct val="94000"/>
         </a:lnSpc>
@@ -3626,7 +3622,7 @@
           <a:cs typeface="+mn-cs"/>
         </a:defRPr>
       </a:lvl8pPr>
-      <a:lvl9pPr marL="4114800" indent="-384048" algn="l" defTabSz="914400" rtl="0" eaLnBrk="1" latinLnBrk="0" hangingPunct="1">
+      <a:lvl9pPr marL="4114800" indent="-384175" algn="l" defTabSz="914400" rtl="0" eaLnBrk="1" latinLnBrk="0" hangingPunct="1">
         <a:lnSpc>
           <a:spcPct val="94000"/>
         </a:lnSpc>
@@ -3744,52 +3740,6 @@
       </a:lvl9pPr>
     </p:otherStyle>
   </p:txStyles>
-  <p:extLst>
-    <p:ext uri="{27BBF7A9-308A-43DC-89C8-2F10F3537804}">
-      <p15:sldGuideLst xmlns:p15="http://schemas.microsoft.com/office/powerpoint/2012/main">
-        <p15:guide id="3" orient="horz" pos="1368">
-          <p15:clr>
-            <a:srgbClr val="F26B43"/>
-          </p15:clr>
-        </p15:guide>
-        <p15:guide id="4" orient="horz" pos="1440">
-          <p15:clr>
-            <a:srgbClr val="F26B43"/>
-          </p15:clr>
-        </p15:guide>
-        <p15:guide id="6" orient="horz" pos="3696">
-          <p15:clr>
-            <a:srgbClr val="F26B43"/>
-          </p15:clr>
-        </p15:guide>
-        <p15:guide id="7" orient="horz" pos="432">
-          <p15:clr>
-            <a:srgbClr val="F26B43"/>
-          </p15:clr>
-        </p15:guide>
-        <p15:guide id="8" orient="horz" pos="1512">
-          <p15:clr>
-            <a:srgbClr val="F26B43"/>
-          </p15:clr>
-        </p15:guide>
-        <p15:guide id="9" pos="6912">
-          <p15:clr>
-            <a:srgbClr val="F26B43"/>
-          </p15:clr>
-        </p15:guide>
-        <p15:guide id="10" pos="936">
-          <p15:clr>
-            <a:srgbClr val="F26B43"/>
-          </p15:clr>
-        </p15:guide>
-        <p15:guide id="11" pos="864">
-          <p15:clr>
-            <a:srgbClr val="F26B43"/>
-          </p15:clr>
-        </p15:guide>
-      </p15:sldGuideLst>
-    </p:ext>
-  </p:extLst>
 </p:sldMaster>
 </file>
 
@@ -3812,13 +3762,7 @@
       </p:grpSpPr>
       <p:sp>
         <p:nvSpPr>
-          <p:cNvPr id="2" name="Title 1">
-            <a:extLst>
-              <a:ext uri="{FF2B5EF4-FFF2-40B4-BE49-F238E27FC236}">
-                <a16:creationId xmlns:a16="http://schemas.microsoft.com/office/drawing/2014/main" id="{33571ED0-74C3-4CC3-A794-54E0AE804E2E}"/>
-              </a:ext>
-            </a:extLst>
-          </p:cNvPr>
+          <p:cNvPr id="2" name="Title 1"/>
           <p:cNvSpPr>
             <a:spLocks noGrp="1"/>
           </p:cNvSpPr>
@@ -3852,11 +3796,6 @@
         </p:txBody>
       </p:sp>
     </p:spTree>
-    <p:extLst>
-      <p:ext uri="{BB962C8B-B14F-4D97-AF65-F5344CB8AC3E}">
-        <p14:creationId xmlns:p14="http://schemas.microsoft.com/office/powerpoint/2010/main" val="160512438"/>
-      </p:ext>
-    </p:extLst>
   </p:cSld>
   <p:clrMapOvr>
     <a:masterClrMapping/>
@@ -3886,13 +3825,7 @@
       </p:grpSpPr>
       <p:sp>
         <p:nvSpPr>
-          <p:cNvPr id="2" name="Title 1">
-            <a:extLst>
-              <a:ext uri="{FF2B5EF4-FFF2-40B4-BE49-F238E27FC236}">
-                <a16:creationId xmlns:a16="http://schemas.microsoft.com/office/drawing/2014/main" id="{33571ED0-74C3-4CC3-A794-54E0AE804E2E}"/>
-              </a:ext>
-            </a:extLst>
-          </p:cNvPr>
+          <p:cNvPr id="2" name="Title 1"/>
           <p:cNvSpPr>
             <a:spLocks noGrp="1"/>
           </p:cNvSpPr>
@@ -3921,13 +3854,7 @@
       </p:sp>
       <p:cxnSp>
         <p:nvCxnSpPr>
-          <p:cNvPr id="4" name="Straight Connector 3">
-            <a:extLst>
-              <a:ext uri="{FF2B5EF4-FFF2-40B4-BE49-F238E27FC236}">
-                <a16:creationId xmlns:a16="http://schemas.microsoft.com/office/drawing/2014/main" id="{34520E75-8D82-4BDE-A07E-CEC2A202B5DD}"/>
-              </a:ext>
-            </a:extLst>
-          </p:cNvPr>
+          <p:cNvPr id="4" name="Straight Connector 3"/>
           <p:cNvCxnSpPr/>
           <p:nvPr/>
         </p:nvCxnSpPr>
@@ -3939,7 +3866,6 @@
           <a:prstGeom prst="line">
             <a:avLst/>
           </a:prstGeom>
-          <a:ln/>
         </p:spPr>
         <p:style>
           <a:lnRef idx="2">
@@ -3958,27 +3884,21 @@
       </p:cxnSp>
       <p:pic>
         <p:nvPicPr>
-          <p:cNvPr id="6" name="Picture 5">
-            <a:extLst>
-              <a:ext uri="{FF2B5EF4-FFF2-40B4-BE49-F238E27FC236}">
-                <a16:creationId xmlns:a16="http://schemas.microsoft.com/office/drawing/2014/main" id="{5B893CF2-9F38-46B4-90ED-2CD787E1F4C8}"/>
-              </a:ext>
-            </a:extLst>
-          </p:cNvPr>
+          <p:cNvPr id="6" name="Picture 5"/>
           <p:cNvPicPr>
             <a:picLocks noChangeAspect="1"/>
           </p:cNvPicPr>
           <p:nvPr/>
         </p:nvPicPr>
         <p:blipFill>
-          <a:blip r:embed="rId2"/>
+          <a:blip r:embed="rId1"/>
           <a:stretch>
             <a:fillRect/>
           </a:stretch>
         </p:blipFill>
         <p:spPr>
           <a:xfrm>
-            <a:off x="2087418" y="2289823"/>
+            <a:off x="2087418" y="2004073"/>
             <a:ext cx="7860146" cy="4476325"/>
           </a:xfrm>
           <a:prstGeom prst="rect">
@@ -3987,11 +3907,6 @@
         </p:spPr>
       </p:pic>
     </p:spTree>
-    <p:extLst>
-      <p:ext uri="{BB962C8B-B14F-4D97-AF65-F5344CB8AC3E}">
-        <p14:creationId xmlns:p14="http://schemas.microsoft.com/office/powerpoint/2010/main" val="4273268832"/>
-      </p:ext>
-    </p:extLst>
   </p:cSld>
   <p:clrMapOvr>
     <a:masterClrMapping/>
@@ -4021,13 +3936,7 @@
       </p:grpSpPr>
       <p:sp>
         <p:nvSpPr>
-          <p:cNvPr id="2" name="Title 1">
-            <a:extLst>
-              <a:ext uri="{FF2B5EF4-FFF2-40B4-BE49-F238E27FC236}">
-                <a16:creationId xmlns:a16="http://schemas.microsoft.com/office/drawing/2014/main" id="{33571ED0-74C3-4CC3-A794-54E0AE804E2E}"/>
-              </a:ext>
-            </a:extLst>
-          </p:cNvPr>
+          <p:cNvPr id="2" name="Title 1"/>
           <p:cNvSpPr>
             <a:spLocks noGrp="1"/>
           </p:cNvSpPr>
@@ -4056,13 +3965,7 @@
       </p:sp>
       <p:sp>
         <p:nvSpPr>
-          <p:cNvPr id="3" name="Subtitle 2">
-            <a:extLst>
-              <a:ext uri="{FF2B5EF4-FFF2-40B4-BE49-F238E27FC236}">
-                <a16:creationId xmlns:a16="http://schemas.microsoft.com/office/drawing/2014/main" id="{75F1B0C3-A2F3-4F9A-A853-C3329BFD291A}"/>
-              </a:ext>
-            </a:extLst>
-          </p:cNvPr>
+          <p:cNvPr id="3" name="Subtitle 2"/>
           <p:cNvSpPr>
             <a:spLocks noGrp="1"/>
           </p:cNvSpPr>
@@ -4110,13 +4013,7 @@
       </p:sp>
       <p:cxnSp>
         <p:nvCxnSpPr>
-          <p:cNvPr id="4" name="Straight Connector 3">
-            <a:extLst>
-              <a:ext uri="{FF2B5EF4-FFF2-40B4-BE49-F238E27FC236}">
-                <a16:creationId xmlns:a16="http://schemas.microsoft.com/office/drawing/2014/main" id="{34520E75-8D82-4BDE-A07E-CEC2A202B5DD}"/>
-              </a:ext>
-            </a:extLst>
-          </p:cNvPr>
+          <p:cNvPr id="4" name="Straight Connector 3"/>
           <p:cNvCxnSpPr/>
           <p:nvPr/>
         </p:nvCxnSpPr>
@@ -4128,7 +4025,6 @@
           <a:prstGeom prst="line">
             <a:avLst/>
           </a:prstGeom>
-          <a:ln/>
         </p:spPr>
         <p:style>
           <a:lnRef idx="2">
@@ -4146,11 +4042,6 @@
         </p:style>
       </p:cxnSp>
     </p:spTree>
-    <p:extLst>
-      <p:ext uri="{BB962C8B-B14F-4D97-AF65-F5344CB8AC3E}">
-        <p14:creationId xmlns:p14="http://schemas.microsoft.com/office/powerpoint/2010/main" val="3921633257"/>
-      </p:ext>
-    </p:extLst>
   </p:cSld>
   <p:clrMapOvr>
     <a:masterClrMapping/>
@@ -4180,13 +4071,7 @@
       </p:grpSpPr>
       <p:sp>
         <p:nvSpPr>
-          <p:cNvPr id="2" name="Title 1">
-            <a:extLst>
-              <a:ext uri="{FF2B5EF4-FFF2-40B4-BE49-F238E27FC236}">
-                <a16:creationId xmlns:a16="http://schemas.microsoft.com/office/drawing/2014/main" id="{33571ED0-74C3-4CC3-A794-54E0AE804E2E}"/>
-              </a:ext>
-            </a:extLst>
-          </p:cNvPr>
+          <p:cNvPr id="2" name="Title 1"/>
           <p:cNvSpPr>
             <a:spLocks noGrp="1"/>
           </p:cNvSpPr>
@@ -4215,13 +4100,7 @@
       </p:sp>
       <p:sp>
         <p:nvSpPr>
-          <p:cNvPr id="3" name="Subtitle 2">
-            <a:extLst>
-              <a:ext uri="{FF2B5EF4-FFF2-40B4-BE49-F238E27FC236}">
-                <a16:creationId xmlns:a16="http://schemas.microsoft.com/office/drawing/2014/main" id="{75F1B0C3-A2F3-4F9A-A853-C3329BFD291A}"/>
-              </a:ext>
-            </a:extLst>
-          </p:cNvPr>
+          <p:cNvPr id="3" name="Subtitle 2"/>
           <p:cNvSpPr>
             <a:spLocks noGrp="1"/>
           </p:cNvSpPr>
@@ -4269,13 +4148,7 @@
       </p:sp>
       <p:cxnSp>
         <p:nvCxnSpPr>
-          <p:cNvPr id="4" name="Straight Connector 3">
-            <a:extLst>
-              <a:ext uri="{FF2B5EF4-FFF2-40B4-BE49-F238E27FC236}">
-                <a16:creationId xmlns:a16="http://schemas.microsoft.com/office/drawing/2014/main" id="{34520E75-8D82-4BDE-A07E-CEC2A202B5DD}"/>
-              </a:ext>
-            </a:extLst>
-          </p:cNvPr>
+          <p:cNvPr id="4" name="Straight Connector 3"/>
           <p:cNvCxnSpPr/>
           <p:nvPr/>
         </p:nvCxnSpPr>
@@ -4287,7 +4160,6 @@
           <a:prstGeom prst="line">
             <a:avLst/>
           </a:prstGeom>
-          <a:ln/>
         </p:spPr>
         <p:style>
           <a:lnRef idx="2">
@@ -4305,11 +4177,6 @@
         </p:style>
       </p:cxnSp>
     </p:spTree>
-    <p:extLst>
-      <p:ext uri="{BB962C8B-B14F-4D97-AF65-F5344CB8AC3E}">
-        <p14:creationId xmlns:p14="http://schemas.microsoft.com/office/powerpoint/2010/main" val="1676694257"/>
-      </p:ext>
-    </p:extLst>
   </p:cSld>
   <p:clrMapOvr>
     <a:masterClrMapping/>
@@ -4339,13 +4206,7 @@
       </p:grpSpPr>
       <p:sp>
         <p:nvSpPr>
-          <p:cNvPr id="2" name="Title 1">
-            <a:extLst>
-              <a:ext uri="{FF2B5EF4-FFF2-40B4-BE49-F238E27FC236}">
-                <a16:creationId xmlns:a16="http://schemas.microsoft.com/office/drawing/2014/main" id="{33571ED0-74C3-4CC3-A794-54E0AE804E2E}"/>
-              </a:ext>
-            </a:extLst>
-          </p:cNvPr>
+          <p:cNvPr id="2" name="Title 1"/>
           <p:cNvSpPr>
             <a:spLocks noGrp="1"/>
           </p:cNvSpPr>
@@ -4374,13 +4235,7 @@
       </p:sp>
       <p:sp>
         <p:nvSpPr>
-          <p:cNvPr id="3" name="Subtitle 2">
-            <a:extLst>
-              <a:ext uri="{FF2B5EF4-FFF2-40B4-BE49-F238E27FC236}">
-                <a16:creationId xmlns:a16="http://schemas.microsoft.com/office/drawing/2014/main" id="{75F1B0C3-A2F3-4F9A-A853-C3329BFD291A}"/>
-              </a:ext>
-            </a:extLst>
-          </p:cNvPr>
+          <p:cNvPr id="3" name="Subtitle 2"/>
           <p:cNvSpPr>
             <a:spLocks noGrp="1"/>
           </p:cNvSpPr>
@@ -4417,6 +4272,12 @@
               </a:rPr>
               <a:t>-	There is no requirement for system maintenance task from the user.</a:t>
             </a:r>
+            <a:endParaRPr lang="en-GB" sz="1800" dirty="0">
+              <a:effectLst/>
+              <a:latin typeface="Calibri" panose="020F0502020204030204" pitchFamily="34" charset="0"/>
+              <a:ea typeface="Calibri" panose="020F0502020204030204" pitchFamily="34" charset="0"/>
+              <a:cs typeface="Times New Roman" panose="02020603050405020304" pitchFamily="18" charset="0"/>
+            </a:endParaRPr>
           </a:p>
           <a:p>
             <a:pPr algn="just">
@@ -4436,6 +4297,12 @@
               </a:rPr>
               <a:t>-	Mean Time Between Failures (MTBF): more than 6 months.</a:t>
             </a:r>
+            <a:endParaRPr lang="en-GB" sz="1800" dirty="0">
+              <a:effectLst/>
+              <a:latin typeface="Calibri" panose="020F0502020204030204" pitchFamily="34" charset="0"/>
+              <a:ea typeface="Calibri" panose="020F0502020204030204" pitchFamily="34" charset="0"/>
+              <a:cs typeface="Times New Roman" panose="02020603050405020304" pitchFamily="18" charset="0"/>
+            </a:endParaRPr>
           </a:p>
           <a:p>
             <a:pPr algn="just">
@@ -4455,6 +4322,12 @@
               </a:rPr>
               <a:t>-	Maximum Bugs and Defect Rate: 0.5 bugs per thousand lines of code (0.5bugs/KLOC).</a:t>
             </a:r>
+            <a:endParaRPr lang="en-GB" sz="1800" dirty="0">
+              <a:effectLst/>
+              <a:latin typeface="Calibri" panose="020F0502020204030204" pitchFamily="34" charset="0"/>
+              <a:ea typeface="Calibri" panose="020F0502020204030204" pitchFamily="34" charset="0"/>
+              <a:cs typeface="Times New Roman" panose="02020603050405020304" pitchFamily="18" charset="0"/>
+            </a:endParaRPr>
           </a:p>
           <a:p>
             <a:pPr algn="just">
@@ -4474,6 +4347,12 @@
               </a:rPr>
               <a:t>-	Critical bugs: </a:t>
             </a:r>
+            <a:endParaRPr lang="en-GB" sz="1800" dirty="0">
+              <a:effectLst/>
+              <a:latin typeface="Calibri" panose="020F0502020204030204" pitchFamily="34" charset="0"/>
+              <a:ea typeface="Calibri" panose="020F0502020204030204" pitchFamily="34" charset="0"/>
+              <a:cs typeface="Times New Roman" panose="02020603050405020304" pitchFamily="18" charset="0"/>
+            </a:endParaRPr>
           </a:p>
           <a:p>
             <a:pPr algn="just">
@@ -4493,6 +4372,12 @@
               </a:rPr>
               <a:t>-	Loss of data: not any.</a:t>
             </a:r>
+            <a:endParaRPr lang="en-GB" sz="1800" dirty="0">
+              <a:effectLst/>
+              <a:latin typeface="Calibri" panose="020F0502020204030204" pitchFamily="34" charset="0"/>
+              <a:ea typeface="Calibri" panose="020F0502020204030204" pitchFamily="34" charset="0"/>
+              <a:cs typeface="Times New Roman" panose="02020603050405020304" pitchFamily="18" charset="0"/>
+            </a:endParaRPr>
           </a:p>
           <a:p>
             <a:pPr algn="just">
@@ -4523,13 +4408,7 @@
       </p:sp>
       <p:cxnSp>
         <p:nvCxnSpPr>
-          <p:cNvPr id="4" name="Straight Connector 3">
-            <a:extLst>
-              <a:ext uri="{FF2B5EF4-FFF2-40B4-BE49-F238E27FC236}">
-                <a16:creationId xmlns:a16="http://schemas.microsoft.com/office/drawing/2014/main" id="{34520E75-8D82-4BDE-A07E-CEC2A202B5DD}"/>
-              </a:ext>
-            </a:extLst>
-          </p:cNvPr>
+          <p:cNvPr id="4" name="Straight Connector 3"/>
           <p:cNvCxnSpPr/>
           <p:nvPr/>
         </p:nvCxnSpPr>
@@ -4541,7 +4420,6 @@
           <a:prstGeom prst="line">
             <a:avLst/>
           </a:prstGeom>
-          <a:ln/>
         </p:spPr>
         <p:style>
           <a:lnRef idx="2">
@@ -4559,11 +4437,6 @@
         </p:style>
       </p:cxnSp>
     </p:spTree>
-    <p:extLst>
-      <p:ext uri="{BB962C8B-B14F-4D97-AF65-F5344CB8AC3E}">
-        <p14:creationId xmlns:p14="http://schemas.microsoft.com/office/powerpoint/2010/main" val="401092806"/>
-      </p:ext>
-    </p:extLst>
   </p:cSld>
   <p:clrMapOvr>
     <a:masterClrMapping/>
@@ -4593,13 +4466,7 @@
       </p:grpSpPr>
       <p:sp>
         <p:nvSpPr>
-          <p:cNvPr id="2" name="Title 1">
-            <a:extLst>
-              <a:ext uri="{FF2B5EF4-FFF2-40B4-BE49-F238E27FC236}">
-                <a16:creationId xmlns:a16="http://schemas.microsoft.com/office/drawing/2014/main" id="{33571ED0-74C3-4CC3-A794-54E0AE804E2E}"/>
-              </a:ext>
-            </a:extLst>
-          </p:cNvPr>
+          <p:cNvPr id="2" name="Title 1"/>
           <p:cNvSpPr>
             <a:spLocks noGrp="1"/>
           </p:cNvSpPr>
@@ -4628,13 +4495,7 @@
       </p:sp>
       <p:sp>
         <p:nvSpPr>
-          <p:cNvPr id="3" name="Subtitle 2">
-            <a:extLst>
-              <a:ext uri="{FF2B5EF4-FFF2-40B4-BE49-F238E27FC236}">
-                <a16:creationId xmlns:a16="http://schemas.microsoft.com/office/drawing/2014/main" id="{75F1B0C3-A2F3-4F9A-A853-C3329BFD291A}"/>
-              </a:ext>
-            </a:extLst>
-          </p:cNvPr>
+          <p:cNvPr id="3" name="Subtitle 2"/>
           <p:cNvSpPr>
             <a:spLocks noGrp="1"/>
           </p:cNvSpPr>
@@ -4738,13 +4599,7 @@
       </p:sp>
       <p:cxnSp>
         <p:nvCxnSpPr>
-          <p:cNvPr id="4" name="Straight Connector 3">
-            <a:extLst>
-              <a:ext uri="{FF2B5EF4-FFF2-40B4-BE49-F238E27FC236}">
-                <a16:creationId xmlns:a16="http://schemas.microsoft.com/office/drawing/2014/main" id="{34520E75-8D82-4BDE-A07E-CEC2A202B5DD}"/>
-              </a:ext>
-            </a:extLst>
-          </p:cNvPr>
+          <p:cNvPr id="4" name="Straight Connector 3"/>
           <p:cNvCxnSpPr/>
           <p:nvPr/>
         </p:nvCxnSpPr>
@@ -4756,7 +4611,6 @@
           <a:prstGeom prst="line">
             <a:avLst/>
           </a:prstGeom>
-          <a:ln/>
         </p:spPr>
         <p:style>
           <a:lnRef idx="2">
@@ -4774,11 +4628,6 @@
         </p:style>
       </p:cxnSp>
     </p:spTree>
-    <p:extLst>
-      <p:ext uri="{BB962C8B-B14F-4D97-AF65-F5344CB8AC3E}">
-        <p14:creationId xmlns:p14="http://schemas.microsoft.com/office/powerpoint/2010/main" val="4109211285"/>
-      </p:ext>
-    </p:extLst>
   </p:cSld>
   <p:clrMapOvr>
     <a:masterClrMapping/>
@@ -4808,13 +4657,7 @@
       </p:grpSpPr>
       <p:sp>
         <p:nvSpPr>
-          <p:cNvPr id="2" name="Title 1">
-            <a:extLst>
-              <a:ext uri="{FF2B5EF4-FFF2-40B4-BE49-F238E27FC236}">
-                <a16:creationId xmlns:a16="http://schemas.microsoft.com/office/drawing/2014/main" id="{33571ED0-74C3-4CC3-A794-54E0AE804E2E}"/>
-              </a:ext>
-            </a:extLst>
-          </p:cNvPr>
+          <p:cNvPr id="2" name="Title 1"/>
           <p:cNvSpPr>
             <a:spLocks noGrp="1"/>
           </p:cNvSpPr>
@@ -4843,13 +4686,7 @@
       </p:sp>
       <p:cxnSp>
         <p:nvCxnSpPr>
-          <p:cNvPr id="4" name="Straight Connector 3">
-            <a:extLst>
-              <a:ext uri="{FF2B5EF4-FFF2-40B4-BE49-F238E27FC236}">
-                <a16:creationId xmlns:a16="http://schemas.microsoft.com/office/drawing/2014/main" id="{34520E75-8D82-4BDE-A07E-CEC2A202B5DD}"/>
-              </a:ext>
-            </a:extLst>
-          </p:cNvPr>
+          <p:cNvPr id="4" name="Straight Connector 3"/>
           <p:cNvCxnSpPr/>
           <p:nvPr/>
         </p:nvCxnSpPr>
@@ -4861,7 +4698,6 @@
           <a:prstGeom prst="line">
             <a:avLst/>
           </a:prstGeom>
-          <a:ln/>
         </p:spPr>
         <p:style>
           <a:lnRef idx="2">
@@ -4880,13 +4716,48 @@
       </p:cxnSp>
       <p:pic>
         <p:nvPicPr>
-          <p:cNvPr id="6146" name="Picture 2" descr="Không có mô tả.">
+          <p:cNvPr id="6146" name="Picture 2" descr="Không có mô tả."/>
+          <p:cNvPicPr>
+            <a:picLocks noChangeAspect="1" noChangeArrowheads="1"/>
+          </p:cNvPicPr>
+          <p:nvPr/>
+        </p:nvPicPr>
+        <p:blipFill>
+          <a:blip r:embed="rId1">
             <a:extLst>
-              <a:ext uri="{FF2B5EF4-FFF2-40B4-BE49-F238E27FC236}">
-                <a16:creationId xmlns:a16="http://schemas.microsoft.com/office/drawing/2014/main" id="{965DE54B-F8C2-4A84-A8A1-70F4CE8D616E}"/>
+              <a:ext uri="{28A0092B-C50C-407E-A947-70E740481C1C}">
+                <a14:useLocalDpi xmlns:a14="http://schemas.microsoft.com/office/drawing/2010/main" val="0"/>
               </a:ext>
             </a:extLst>
-          </p:cNvPr>
+          </a:blip>
+          <a:srcRect/>
+          <a:stretch>
+            <a:fillRect/>
+          </a:stretch>
+        </p:blipFill>
+        <p:spPr bwMode="auto">
+          <a:xfrm>
+            <a:off x="1862286" y="2329738"/>
+            <a:ext cx="1922896" cy="4168044"/>
+          </a:xfrm>
+          <a:prstGeom prst="rect">
+            <a:avLst/>
+          </a:prstGeom>
+          <a:noFill/>
+          <a:extLst>
+            <a:ext uri="{909E8E84-426E-40DD-AFC4-6F175D3DCCD1}">
+              <a14:hiddenFill xmlns:a14="http://schemas.microsoft.com/office/drawing/2010/main">
+                <a:solidFill>
+                  <a:srgbClr val="FFFFFF"/>
+                </a:solidFill>
+              </a14:hiddenFill>
+            </a:ext>
+          </a:extLst>
+        </p:spPr>
+      </p:pic>
+      <p:pic>
+        <p:nvPicPr>
+          <p:cNvPr id="6150" name="Picture 6" descr="Không có mô tả."/>
           <p:cNvPicPr>
             <a:picLocks noChangeAspect="1" noChangeArrowheads="1"/>
           </p:cNvPicPr>
@@ -4907,7 +4778,7 @@
         </p:blipFill>
         <p:spPr bwMode="auto">
           <a:xfrm>
-            <a:off x="1862286" y="2329738"/>
+            <a:off x="4043797" y="2329738"/>
             <a:ext cx="1922896" cy="4168044"/>
           </a:xfrm>
           <a:prstGeom prst="rect">
@@ -4927,13 +4798,7 @@
       </p:pic>
       <p:pic>
         <p:nvPicPr>
-          <p:cNvPr id="6150" name="Picture 6" descr="Không có mô tả.">
-            <a:extLst>
-              <a:ext uri="{FF2B5EF4-FFF2-40B4-BE49-F238E27FC236}">
-                <a16:creationId xmlns:a16="http://schemas.microsoft.com/office/drawing/2014/main" id="{4DAFF546-A2F8-49AF-9D5C-9FF2E9AE59D4}"/>
-              </a:ext>
-            </a:extLst>
-          </p:cNvPr>
+          <p:cNvPr id="6152" name="Picture 8" descr="Không có mô tả."/>
           <p:cNvPicPr>
             <a:picLocks noChangeAspect="1" noChangeArrowheads="1"/>
           </p:cNvPicPr>
@@ -4954,7 +4819,7 @@
         </p:blipFill>
         <p:spPr bwMode="auto">
           <a:xfrm>
-            <a:off x="4043797" y="2329738"/>
+            <a:off x="8406247" y="2329738"/>
             <a:ext cx="1922896" cy="4168044"/>
           </a:xfrm>
           <a:prstGeom prst="rect">
@@ -4974,13 +4839,7 @@
       </p:pic>
       <p:pic>
         <p:nvPicPr>
-          <p:cNvPr id="6152" name="Picture 8" descr="Không có mô tả.">
-            <a:extLst>
-              <a:ext uri="{FF2B5EF4-FFF2-40B4-BE49-F238E27FC236}">
-                <a16:creationId xmlns:a16="http://schemas.microsoft.com/office/drawing/2014/main" id="{E05672C8-7091-465A-A644-7D5A05CD8936}"/>
-              </a:ext>
-            </a:extLst>
-          </p:cNvPr>
+          <p:cNvPr id="6154" name="Picture 10" descr="Không có mô tả."/>
           <p:cNvPicPr>
             <a:picLocks noChangeAspect="1" noChangeArrowheads="1"/>
           </p:cNvPicPr>
@@ -5001,7 +4860,7 @@
         </p:blipFill>
         <p:spPr bwMode="auto">
           <a:xfrm>
-            <a:off x="8406247" y="2329738"/>
+            <a:off x="6225308" y="2329738"/>
             <a:ext cx="1922896" cy="4168044"/>
           </a:xfrm>
           <a:prstGeom prst="rect">
@@ -5019,59 +4878,7 @@
           </a:extLst>
         </p:spPr>
       </p:pic>
-      <p:pic>
-        <p:nvPicPr>
-          <p:cNvPr id="6154" name="Picture 10" descr="Không có mô tả.">
-            <a:extLst>
-              <a:ext uri="{FF2B5EF4-FFF2-40B4-BE49-F238E27FC236}">
-                <a16:creationId xmlns:a16="http://schemas.microsoft.com/office/drawing/2014/main" id="{10A4D3FA-9FE1-45E9-BC0C-1615CB393135}"/>
-              </a:ext>
-            </a:extLst>
-          </p:cNvPr>
-          <p:cNvPicPr>
-            <a:picLocks noChangeAspect="1" noChangeArrowheads="1"/>
-          </p:cNvPicPr>
-          <p:nvPr/>
-        </p:nvPicPr>
-        <p:blipFill>
-          <a:blip r:embed="rId5">
-            <a:extLst>
-              <a:ext uri="{28A0092B-C50C-407E-A947-70E740481C1C}">
-                <a14:useLocalDpi xmlns:a14="http://schemas.microsoft.com/office/drawing/2010/main" val="0"/>
-              </a:ext>
-            </a:extLst>
-          </a:blip>
-          <a:srcRect/>
-          <a:stretch>
-            <a:fillRect/>
-          </a:stretch>
-        </p:blipFill>
-        <p:spPr bwMode="auto">
-          <a:xfrm>
-            <a:off x="6225308" y="2329738"/>
-            <a:ext cx="1922896" cy="4168044"/>
-          </a:xfrm>
-          <a:prstGeom prst="rect">
-            <a:avLst/>
-          </a:prstGeom>
-          <a:noFill/>
-          <a:extLst>
-            <a:ext uri="{909E8E84-426E-40DD-AFC4-6F175D3DCCD1}">
-              <a14:hiddenFill xmlns:a14="http://schemas.microsoft.com/office/drawing/2010/main">
-                <a:solidFill>
-                  <a:srgbClr val="FFFFFF"/>
-                </a:solidFill>
-              </a14:hiddenFill>
-            </a:ext>
-          </a:extLst>
-        </p:spPr>
-      </p:pic>
     </p:spTree>
-    <p:extLst>
-      <p:ext uri="{BB962C8B-B14F-4D97-AF65-F5344CB8AC3E}">
-        <p14:creationId xmlns:p14="http://schemas.microsoft.com/office/powerpoint/2010/main" val="3663404034"/>
-      </p:ext>
-    </p:extLst>
   </p:cSld>
   <p:clrMapOvr>
     <a:masterClrMapping/>
@@ -5101,13 +4908,7 @@
       </p:grpSpPr>
       <p:sp>
         <p:nvSpPr>
-          <p:cNvPr id="2" name="Title 1">
-            <a:extLst>
-              <a:ext uri="{FF2B5EF4-FFF2-40B4-BE49-F238E27FC236}">
-                <a16:creationId xmlns:a16="http://schemas.microsoft.com/office/drawing/2014/main" id="{33571ED0-74C3-4CC3-A794-54E0AE804E2E}"/>
-              </a:ext>
-            </a:extLst>
-          </p:cNvPr>
+          <p:cNvPr id="2" name="Title 1"/>
           <p:cNvSpPr>
             <a:spLocks noGrp="1"/>
           </p:cNvSpPr>
@@ -5135,13 +4936,7 @@
       </p:sp>
       <p:sp>
         <p:nvSpPr>
-          <p:cNvPr id="3" name="Subtitle 2">
-            <a:extLst>
-              <a:ext uri="{FF2B5EF4-FFF2-40B4-BE49-F238E27FC236}">
-                <a16:creationId xmlns:a16="http://schemas.microsoft.com/office/drawing/2014/main" id="{75F1B0C3-A2F3-4F9A-A853-C3329BFD291A}"/>
-              </a:ext>
-            </a:extLst>
-          </p:cNvPr>
+          <p:cNvPr id="3" name="Subtitle 2"/>
           <p:cNvSpPr>
             <a:spLocks noGrp="1"/>
           </p:cNvSpPr>
@@ -5252,18 +5047,15 @@
               </a:rPr>
               <a:t>Dương Đình Nguyên</a:t>
             </a:r>
+            <a:endParaRPr lang="vi-VN" dirty="0">
+              <a:latin typeface="Franklin Gothic Book (Body)"/>
+            </a:endParaRPr>
           </a:p>
         </p:txBody>
       </p:sp>
       <p:cxnSp>
         <p:nvCxnSpPr>
-          <p:cNvPr id="5" name="Straight Connector 4">
-            <a:extLst>
-              <a:ext uri="{FF2B5EF4-FFF2-40B4-BE49-F238E27FC236}">
-                <a16:creationId xmlns:a16="http://schemas.microsoft.com/office/drawing/2014/main" id="{CD27D035-BE8C-48BF-9794-770197F7BE01}"/>
-              </a:ext>
-            </a:extLst>
-          </p:cNvPr>
+          <p:cNvPr id="5" name="Straight Connector 4"/>
           <p:cNvCxnSpPr/>
           <p:nvPr/>
         </p:nvCxnSpPr>
@@ -5275,7 +5067,6 @@
           <a:prstGeom prst="line">
             <a:avLst/>
           </a:prstGeom>
-          <a:ln/>
         </p:spPr>
         <p:style>
           <a:lnRef idx="2">
@@ -5293,11 +5084,6 @@
         </p:style>
       </p:cxnSp>
     </p:spTree>
-    <p:extLst>
-      <p:ext uri="{BB962C8B-B14F-4D97-AF65-F5344CB8AC3E}">
-        <p14:creationId xmlns:p14="http://schemas.microsoft.com/office/powerpoint/2010/main" val="787197606"/>
-      </p:ext>
-    </p:extLst>
   </p:cSld>
   <p:clrMapOvr>
     <a:masterClrMapping/>
@@ -5327,13 +5113,7 @@
       </p:grpSpPr>
       <p:sp>
         <p:nvSpPr>
-          <p:cNvPr id="2" name="Title 1">
-            <a:extLst>
-              <a:ext uri="{FF2B5EF4-FFF2-40B4-BE49-F238E27FC236}">
-                <a16:creationId xmlns:a16="http://schemas.microsoft.com/office/drawing/2014/main" id="{33571ED0-74C3-4CC3-A794-54E0AE804E2E}"/>
-              </a:ext>
-            </a:extLst>
-          </p:cNvPr>
+          <p:cNvPr id="2" name="Title 1"/>
           <p:cNvSpPr>
             <a:spLocks noGrp="1"/>
           </p:cNvSpPr>
@@ -5361,13 +5141,7 @@
       </p:sp>
       <p:sp>
         <p:nvSpPr>
-          <p:cNvPr id="3" name="Subtitle 2">
-            <a:extLst>
-              <a:ext uri="{FF2B5EF4-FFF2-40B4-BE49-F238E27FC236}">
-                <a16:creationId xmlns:a16="http://schemas.microsoft.com/office/drawing/2014/main" id="{75F1B0C3-A2F3-4F9A-A853-C3329BFD291A}"/>
-              </a:ext>
-            </a:extLst>
-          </p:cNvPr>
+          <p:cNvPr id="3" name="Subtitle 2"/>
           <p:cNvSpPr>
             <a:spLocks noGrp="1"/>
           </p:cNvSpPr>
@@ -5394,6 +5168,7 @@
               <a:rPr lang="en-GB" sz="2800" dirty="0"/>
               <a:t>Product scope</a:t>
             </a:r>
+            <a:endParaRPr lang="en-GB" sz="2800" dirty="0"/>
           </a:p>
           <a:p>
             <a:pPr marL="457200" indent="-457200" algn="l">
@@ -5403,6 +5178,7 @@
               <a:rPr lang="en-GB" sz="2800" dirty="0"/>
               <a:t>Actor</a:t>
             </a:r>
+            <a:endParaRPr lang="en-GB" sz="2800" dirty="0"/>
           </a:p>
           <a:p>
             <a:pPr marL="457200" indent="-457200" algn="l">
@@ -5412,6 +5188,7 @@
               <a:rPr lang="en-GB" sz="2800" dirty="0"/>
               <a:t>Functional requirement</a:t>
             </a:r>
+            <a:endParaRPr lang="en-GB" sz="2800" dirty="0"/>
           </a:p>
           <a:p>
             <a:pPr marL="457200" indent="-457200" algn="l">
@@ -5421,6 +5198,7 @@
               <a:rPr lang="en-GB" sz="2800" dirty="0"/>
               <a:t>Use case</a:t>
             </a:r>
+            <a:endParaRPr lang="en-GB" sz="2800" dirty="0"/>
           </a:p>
           <a:p>
             <a:pPr marL="457200" indent="-457200" algn="l">
@@ -5430,6 +5208,7 @@
               <a:rPr lang="en-GB" sz="2800" dirty="0"/>
               <a:t>Architecture style</a:t>
             </a:r>
+            <a:endParaRPr lang="en-GB" sz="2800" dirty="0"/>
           </a:p>
           <a:p>
             <a:pPr marL="457200" indent="-457200" algn="l">
@@ -5439,6 +5218,7 @@
               <a:rPr lang="en-GB" sz="2800" dirty="0"/>
               <a:t>Availability</a:t>
             </a:r>
+            <a:endParaRPr lang="en-GB" sz="2800" dirty="0"/>
           </a:p>
           <a:p>
             <a:pPr marL="457200" indent="-457200" algn="l">
@@ -5448,6 +5228,7 @@
               <a:rPr lang="en-GB" sz="2800" dirty="0"/>
               <a:t>Reliability</a:t>
             </a:r>
+            <a:endParaRPr lang="en-GB" sz="2800" dirty="0"/>
           </a:p>
           <a:p>
             <a:pPr marL="457200" indent="-457200" algn="l">
@@ -5457,6 +5238,7 @@
               <a:rPr lang="en-GB" sz="2800" dirty="0"/>
               <a:t>Performance</a:t>
             </a:r>
+            <a:endParaRPr lang="en-GB" sz="2800" dirty="0"/>
           </a:p>
           <a:p>
             <a:pPr marL="457200" indent="-457200" algn="l">
@@ -5467,6 +5249,7 @@
               <a:rPr lang="en-GB" sz="2800" dirty="0"/>
               <a:t>Sample interface</a:t>
             </a:r>
+            <a:endParaRPr lang="en-GB" sz="2800" dirty="0"/>
           </a:p>
           <a:p>
             <a:pPr marL="457200" indent="-457200" algn="l">
@@ -5484,13 +5267,7 @@
       </p:sp>
       <p:cxnSp>
         <p:nvCxnSpPr>
-          <p:cNvPr id="4" name="Straight Connector 3">
-            <a:extLst>
-              <a:ext uri="{FF2B5EF4-FFF2-40B4-BE49-F238E27FC236}">
-                <a16:creationId xmlns:a16="http://schemas.microsoft.com/office/drawing/2014/main" id="{34520E75-8D82-4BDE-A07E-CEC2A202B5DD}"/>
-              </a:ext>
-            </a:extLst>
-          </p:cNvPr>
+          <p:cNvPr id="4" name="Straight Connector 3"/>
           <p:cNvCxnSpPr/>
           <p:nvPr/>
         </p:nvCxnSpPr>
@@ -5502,7 +5279,6 @@
           <a:prstGeom prst="line">
             <a:avLst/>
           </a:prstGeom>
-          <a:ln/>
         </p:spPr>
         <p:style>
           <a:lnRef idx="2">
@@ -5520,11 +5296,6 @@
         </p:style>
       </p:cxnSp>
     </p:spTree>
-    <p:extLst>
-      <p:ext uri="{BB962C8B-B14F-4D97-AF65-F5344CB8AC3E}">
-        <p14:creationId xmlns:p14="http://schemas.microsoft.com/office/powerpoint/2010/main" val="4213615557"/>
-      </p:ext>
-    </p:extLst>
   </p:cSld>
   <p:clrMapOvr>
     <a:masterClrMapping/>
@@ -5554,13 +5325,7 @@
       </p:grpSpPr>
       <p:sp>
         <p:nvSpPr>
-          <p:cNvPr id="2" name="Title 1">
-            <a:extLst>
-              <a:ext uri="{FF2B5EF4-FFF2-40B4-BE49-F238E27FC236}">
-                <a16:creationId xmlns:a16="http://schemas.microsoft.com/office/drawing/2014/main" id="{33571ED0-74C3-4CC3-A794-54E0AE804E2E}"/>
-              </a:ext>
-            </a:extLst>
-          </p:cNvPr>
+          <p:cNvPr id="2" name="Title 1"/>
           <p:cNvSpPr>
             <a:spLocks noGrp="1"/>
           </p:cNvSpPr>
@@ -5589,13 +5354,7 @@
       </p:sp>
       <p:sp>
         <p:nvSpPr>
-          <p:cNvPr id="3" name="Subtitle 2">
-            <a:extLst>
-              <a:ext uri="{FF2B5EF4-FFF2-40B4-BE49-F238E27FC236}">
-                <a16:creationId xmlns:a16="http://schemas.microsoft.com/office/drawing/2014/main" id="{75F1B0C3-A2F3-4F9A-A853-C3329BFD291A}"/>
-              </a:ext>
-            </a:extLst>
-          </p:cNvPr>
+          <p:cNvPr id="3" name="Subtitle 2"/>
           <p:cNvSpPr>
             <a:spLocks noGrp="1"/>
           </p:cNvSpPr>
@@ -5705,13 +5464,7 @@
       </p:sp>
       <p:cxnSp>
         <p:nvCxnSpPr>
-          <p:cNvPr id="4" name="Straight Connector 3">
-            <a:extLst>
-              <a:ext uri="{FF2B5EF4-FFF2-40B4-BE49-F238E27FC236}">
-                <a16:creationId xmlns:a16="http://schemas.microsoft.com/office/drawing/2014/main" id="{34520E75-8D82-4BDE-A07E-CEC2A202B5DD}"/>
-              </a:ext>
-            </a:extLst>
-          </p:cNvPr>
+          <p:cNvPr id="4" name="Straight Connector 3"/>
           <p:cNvCxnSpPr/>
           <p:nvPr/>
         </p:nvCxnSpPr>
@@ -5723,7 +5476,6 @@
           <a:prstGeom prst="line">
             <a:avLst/>
           </a:prstGeom>
-          <a:ln/>
         </p:spPr>
         <p:style>
           <a:lnRef idx="2">
@@ -5741,11 +5493,6 @@
         </p:style>
       </p:cxnSp>
     </p:spTree>
-    <p:extLst>
-      <p:ext uri="{BB962C8B-B14F-4D97-AF65-F5344CB8AC3E}">
-        <p14:creationId xmlns:p14="http://schemas.microsoft.com/office/powerpoint/2010/main" val="3155468227"/>
-      </p:ext>
-    </p:extLst>
   </p:cSld>
   <p:clrMapOvr>
     <a:masterClrMapping/>
@@ -5775,13 +5522,7 @@
       </p:grpSpPr>
       <p:sp>
         <p:nvSpPr>
-          <p:cNvPr id="2" name="Title 1">
-            <a:extLst>
-              <a:ext uri="{FF2B5EF4-FFF2-40B4-BE49-F238E27FC236}">
-                <a16:creationId xmlns:a16="http://schemas.microsoft.com/office/drawing/2014/main" id="{33571ED0-74C3-4CC3-A794-54E0AE804E2E}"/>
-              </a:ext>
-            </a:extLst>
-          </p:cNvPr>
+          <p:cNvPr id="2" name="Title 1"/>
           <p:cNvSpPr>
             <a:spLocks noGrp="1"/>
           </p:cNvSpPr>
@@ -5810,13 +5551,7 @@
       </p:sp>
       <p:sp>
         <p:nvSpPr>
-          <p:cNvPr id="3" name="Subtitle 2">
-            <a:extLst>
-              <a:ext uri="{FF2B5EF4-FFF2-40B4-BE49-F238E27FC236}">
-                <a16:creationId xmlns:a16="http://schemas.microsoft.com/office/drawing/2014/main" id="{75F1B0C3-A2F3-4F9A-A853-C3329BFD291A}"/>
-              </a:ext>
-            </a:extLst>
-          </p:cNvPr>
+          <p:cNvPr id="3" name="Subtitle 2"/>
           <p:cNvSpPr>
             <a:spLocks noGrp="1"/>
           </p:cNvSpPr>
@@ -5853,6 +5588,12 @@
               </a:rPr>
               <a:t>The system will have 3 main actors:</a:t>
             </a:r>
+            <a:endParaRPr lang="en-GB" sz="1800" dirty="0">
+              <a:effectLst/>
+              <a:latin typeface="Calibri" panose="020F0502020204030204" pitchFamily="34" charset="0"/>
+              <a:ea typeface="Calibri" panose="020F0502020204030204" pitchFamily="34" charset="0"/>
+              <a:cs typeface="Times New Roman" panose="02020603050405020304" pitchFamily="18" charset="0"/>
+            </a:endParaRPr>
           </a:p>
           <a:p>
             <a:pPr marL="342900" lvl="0" indent="-342900" algn="l">
@@ -5949,13 +5690,7 @@
       </p:sp>
       <p:cxnSp>
         <p:nvCxnSpPr>
-          <p:cNvPr id="4" name="Straight Connector 3">
-            <a:extLst>
-              <a:ext uri="{FF2B5EF4-FFF2-40B4-BE49-F238E27FC236}">
-                <a16:creationId xmlns:a16="http://schemas.microsoft.com/office/drawing/2014/main" id="{34520E75-8D82-4BDE-A07E-CEC2A202B5DD}"/>
-              </a:ext>
-            </a:extLst>
-          </p:cNvPr>
+          <p:cNvPr id="4" name="Straight Connector 3"/>
           <p:cNvCxnSpPr/>
           <p:nvPr/>
         </p:nvCxnSpPr>
@@ -5967,7 +5702,6 @@
           <a:prstGeom prst="line">
             <a:avLst/>
           </a:prstGeom>
-          <a:ln/>
         </p:spPr>
         <p:style>
           <a:lnRef idx="2">
@@ -5985,11 +5719,6 @@
         </p:style>
       </p:cxnSp>
     </p:spTree>
-    <p:extLst>
-      <p:ext uri="{BB962C8B-B14F-4D97-AF65-F5344CB8AC3E}">
-        <p14:creationId xmlns:p14="http://schemas.microsoft.com/office/powerpoint/2010/main" val="2287714076"/>
-      </p:ext>
-    </p:extLst>
   </p:cSld>
   <p:clrMapOvr>
     <a:masterClrMapping/>
@@ -6019,13 +5748,7 @@
       </p:grpSpPr>
       <p:sp>
         <p:nvSpPr>
-          <p:cNvPr id="2" name="Title 1">
-            <a:extLst>
-              <a:ext uri="{FF2B5EF4-FFF2-40B4-BE49-F238E27FC236}">
-                <a16:creationId xmlns:a16="http://schemas.microsoft.com/office/drawing/2014/main" id="{33571ED0-74C3-4CC3-A794-54E0AE804E2E}"/>
-              </a:ext>
-            </a:extLst>
-          </p:cNvPr>
+          <p:cNvPr id="2" name="Title 1"/>
           <p:cNvSpPr>
             <a:spLocks noGrp="1"/>
           </p:cNvSpPr>
@@ -6054,13 +5777,7 @@
       </p:sp>
       <p:sp>
         <p:nvSpPr>
-          <p:cNvPr id="3" name="Subtitle 2">
-            <a:extLst>
-              <a:ext uri="{FF2B5EF4-FFF2-40B4-BE49-F238E27FC236}">
-                <a16:creationId xmlns:a16="http://schemas.microsoft.com/office/drawing/2014/main" id="{75F1B0C3-A2F3-4F9A-A853-C3329BFD291A}"/>
-              </a:ext>
-            </a:extLst>
-          </p:cNvPr>
+          <p:cNvPr id="3" name="Subtitle 2"/>
           <p:cNvSpPr>
             <a:spLocks noGrp="1"/>
           </p:cNvSpPr>
@@ -6097,6 +5814,12 @@
               </a:rPr>
               <a:t>For users:</a:t>
             </a:r>
+            <a:endParaRPr lang="en-GB" sz="1800" dirty="0">
+              <a:effectLst/>
+              <a:latin typeface="Calibri" panose="020F0502020204030204" pitchFamily="34" charset="0"/>
+              <a:ea typeface="Calibri" panose="020F0502020204030204" pitchFamily="34" charset="0"/>
+              <a:cs typeface="Times New Roman" panose="02020603050405020304" pitchFamily="18" charset="0"/>
+            </a:endParaRPr>
           </a:p>
           <a:p>
             <a:pPr marL="285750" indent="-285750" algn="just">
@@ -6171,6 +5894,12 @@
               </a:rPr>
               <a:t>Users can create information about their pet profiles (weight/ kind of pet/…).</a:t>
             </a:r>
+            <a:endParaRPr lang="en-US" sz="1800" dirty="0">
+              <a:effectLst/>
+              <a:latin typeface="Calibri" panose="020F0502020204030204" pitchFamily="34" charset="0"/>
+              <a:ea typeface="Calibri" panose="020F0502020204030204" pitchFamily="34" charset="0"/>
+              <a:cs typeface="Times New Roman" panose="02020603050405020304" pitchFamily="18" charset="0"/>
+            </a:endParaRPr>
           </a:p>
           <a:p>
             <a:pPr marL="285750" indent="-285750" algn="just">
@@ -6192,6 +5921,12 @@
               </a:rPr>
               <a:t>Users can book an appointment for their pet base on the service.</a:t>
             </a:r>
+            <a:endParaRPr lang="en-US" sz="1800" dirty="0">
+              <a:effectLst/>
+              <a:latin typeface="Calibri" panose="020F0502020204030204" pitchFamily="34" charset="0"/>
+              <a:ea typeface="Calibri" panose="020F0502020204030204" pitchFamily="34" charset="0"/>
+              <a:cs typeface="Times New Roman" panose="02020603050405020304" pitchFamily="18" charset="0"/>
+            </a:endParaRPr>
           </a:p>
           <a:p>
             <a:pPr marL="285750" indent="-285750" algn="just">
@@ -6213,18 +5948,18 @@
               </a:rPr>
               <a:t>Users can pay the services online </a:t>
             </a:r>
+            <a:endParaRPr lang="en-US" sz="1800" dirty="0">
+              <a:effectLst/>
+              <a:latin typeface="Calibri" panose="020F0502020204030204" pitchFamily="34" charset="0"/>
+              <a:ea typeface="Calibri" panose="020F0502020204030204" pitchFamily="34" charset="0"/>
+              <a:cs typeface="Times New Roman" panose="02020603050405020304" pitchFamily="18" charset="0"/>
+            </a:endParaRPr>
           </a:p>
         </p:txBody>
       </p:sp>
       <p:cxnSp>
         <p:nvCxnSpPr>
-          <p:cNvPr id="4" name="Straight Connector 3">
-            <a:extLst>
-              <a:ext uri="{FF2B5EF4-FFF2-40B4-BE49-F238E27FC236}">
-                <a16:creationId xmlns:a16="http://schemas.microsoft.com/office/drawing/2014/main" id="{34520E75-8D82-4BDE-A07E-CEC2A202B5DD}"/>
-              </a:ext>
-            </a:extLst>
-          </p:cNvPr>
+          <p:cNvPr id="4" name="Straight Connector 3"/>
           <p:cNvCxnSpPr/>
           <p:nvPr/>
         </p:nvCxnSpPr>
@@ -6236,7 +5971,6 @@
           <a:prstGeom prst="line">
             <a:avLst/>
           </a:prstGeom>
-          <a:ln/>
         </p:spPr>
         <p:style>
           <a:lnRef idx="2">
@@ -6254,11 +5988,6 @@
         </p:style>
       </p:cxnSp>
     </p:spTree>
-    <p:extLst>
-      <p:ext uri="{BB962C8B-B14F-4D97-AF65-F5344CB8AC3E}">
-        <p14:creationId xmlns:p14="http://schemas.microsoft.com/office/powerpoint/2010/main" val="4276789224"/>
-      </p:ext>
-    </p:extLst>
   </p:cSld>
   <p:clrMapOvr>
     <a:masterClrMapping/>
@@ -6288,13 +6017,7 @@
       </p:grpSpPr>
       <p:sp>
         <p:nvSpPr>
-          <p:cNvPr id="2" name="Title 1">
-            <a:extLst>
-              <a:ext uri="{FF2B5EF4-FFF2-40B4-BE49-F238E27FC236}">
-                <a16:creationId xmlns:a16="http://schemas.microsoft.com/office/drawing/2014/main" id="{33571ED0-74C3-4CC3-A794-54E0AE804E2E}"/>
-              </a:ext>
-            </a:extLst>
-          </p:cNvPr>
+          <p:cNvPr id="2" name="Title 1"/>
           <p:cNvSpPr>
             <a:spLocks noGrp="1"/>
           </p:cNvSpPr>
@@ -6323,13 +6046,7 @@
       </p:sp>
       <p:sp>
         <p:nvSpPr>
-          <p:cNvPr id="3" name="Subtitle 2">
-            <a:extLst>
-              <a:ext uri="{FF2B5EF4-FFF2-40B4-BE49-F238E27FC236}">
-                <a16:creationId xmlns:a16="http://schemas.microsoft.com/office/drawing/2014/main" id="{75F1B0C3-A2F3-4F9A-A853-C3329BFD291A}"/>
-              </a:ext>
-            </a:extLst>
-          </p:cNvPr>
+          <p:cNvPr id="3" name="Subtitle 2"/>
           <p:cNvSpPr>
             <a:spLocks noGrp="1"/>
           </p:cNvSpPr>
@@ -6366,6 +6083,12 @@
               </a:rPr>
               <a:t>For users:</a:t>
             </a:r>
+            <a:endParaRPr lang="en-GB" sz="1800" dirty="0">
+              <a:effectLst/>
+              <a:latin typeface="Calibri" panose="020F0502020204030204" pitchFamily="34" charset="0"/>
+              <a:ea typeface="Calibri" panose="020F0502020204030204" pitchFamily="34" charset="0"/>
+              <a:cs typeface="Times New Roman" panose="02020603050405020304" pitchFamily="18" charset="0"/>
+            </a:endParaRPr>
           </a:p>
           <a:p>
             <a:pPr marL="285750" indent="-285750" algn="just">
@@ -6387,6 +6110,12 @@
               </a:rPr>
               <a:t>Users can view the store owner’s products and the store owner’s services</a:t>
             </a:r>
+            <a:endParaRPr lang="en-US" sz="1800" dirty="0">
+              <a:effectLst/>
+              <a:latin typeface="Calibri" panose="020F0502020204030204" pitchFamily="34" charset="0"/>
+              <a:ea typeface="Calibri" panose="020F0502020204030204" pitchFamily="34" charset="0"/>
+              <a:cs typeface="Times New Roman" panose="02020603050405020304" pitchFamily="18" charset="0"/>
+            </a:endParaRPr>
           </a:p>
           <a:p>
             <a:pPr marL="285750" indent="-285750" algn="just">
@@ -6408,6 +6137,12 @@
               </a:rPr>
               <a:t>Users can rate and comments about the store’s service and products</a:t>
             </a:r>
+            <a:endParaRPr lang="en-US" sz="1800" dirty="0">
+              <a:effectLst/>
+              <a:latin typeface="Calibri" panose="020F0502020204030204" pitchFamily="34" charset="0"/>
+              <a:ea typeface="Calibri" panose="020F0502020204030204" pitchFamily="34" charset="0"/>
+              <a:cs typeface="Times New Roman" panose="02020603050405020304" pitchFamily="18" charset="0"/>
+            </a:endParaRPr>
           </a:p>
           <a:p>
             <a:pPr marL="285750" indent="-285750" algn="just">
@@ -6429,6 +6164,12 @@
               </a:rPr>
               <a:t>Users can find the nearest store on the map</a:t>
             </a:r>
+            <a:endParaRPr lang="en-US" sz="1800" dirty="0">
+              <a:effectLst/>
+              <a:latin typeface="Calibri" panose="020F0502020204030204" pitchFamily="34" charset="0"/>
+              <a:ea typeface="Calibri" panose="020F0502020204030204" pitchFamily="34" charset="0"/>
+              <a:cs typeface="Times New Roman" panose="02020603050405020304" pitchFamily="18" charset="0"/>
+            </a:endParaRPr>
           </a:p>
           <a:p>
             <a:pPr marL="285750" indent="-285750" algn="just">
@@ -6476,6 +6217,12 @@
               </a:rPr>
               <a:t>Users can keep track on their pets’ status(weight, hunger, health condition,…) through the collar.</a:t>
             </a:r>
+            <a:endParaRPr lang="en-US" sz="1800" dirty="0">
+              <a:effectLst/>
+              <a:latin typeface="Calibri" panose="020F0502020204030204" pitchFamily="34" charset="0"/>
+              <a:ea typeface="Calibri" panose="020F0502020204030204" pitchFamily="34" charset="0"/>
+              <a:cs typeface="Times New Roman" panose="02020603050405020304" pitchFamily="18" charset="0"/>
+            </a:endParaRPr>
           </a:p>
           <a:p>
             <a:pPr marL="285750" indent="-285750" algn="just">
@@ -6526,13 +6273,7 @@
       </p:sp>
       <p:cxnSp>
         <p:nvCxnSpPr>
-          <p:cNvPr id="4" name="Straight Connector 3">
-            <a:extLst>
-              <a:ext uri="{FF2B5EF4-FFF2-40B4-BE49-F238E27FC236}">
-                <a16:creationId xmlns:a16="http://schemas.microsoft.com/office/drawing/2014/main" id="{34520E75-8D82-4BDE-A07E-CEC2A202B5DD}"/>
-              </a:ext>
-            </a:extLst>
-          </p:cNvPr>
+          <p:cNvPr id="4" name="Straight Connector 3"/>
           <p:cNvCxnSpPr/>
           <p:nvPr/>
         </p:nvCxnSpPr>
@@ -6544,7 +6285,6 @@
           <a:prstGeom prst="line">
             <a:avLst/>
           </a:prstGeom>
-          <a:ln/>
         </p:spPr>
         <p:style>
           <a:lnRef idx="2">
@@ -6562,11 +6302,6 @@
         </p:style>
       </p:cxnSp>
     </p:spTree>
-    <p:extLst>
-      <p:ext uri="{BB962C8B-B14F-4D97-AF65-F5344CB8AC3E}">
-        <p14:creationId xmlns:p14="http://schemas.microsoft.com/office/powerpoint/2010/main" val="461225581"/>
-      </p:ext>
-    </p:extLst>
   </p:cSld>
   <p:clrMapOvr>
     <a:masterClrMapping/>
@@ -6596,13 +6331,7 @@
       </p:grpSpPr>
       <p:sp>
         <p:nvSpPr>
-          <p:cNvPr id="2" name="Title 1">
-            <a:extLst>
-              <a:ext uri="{FF2B5EF4-FFF2-40B4-BE49-F238E27FC236}">
-                <a16:creationId xmlns:a16="http://schemas.microsoft.com/office/drawing/2014/main" id="{33571ED0-74C3-4CC3-A794-54E0AE804E2E}"/>
-              </a:ext>
-            </a:extLst>
-          </p:cNvPr>
+          <p:cNvPr id="2" name="Title 1"/>
           <p:cNvSpPr>
             <a:spLocks noGrp="1"/>
           </p:cNvSpPr>
@@ -6631,13 +6360,7 @@
       </p:sp>
       <p:sp>
         <p:nvSpPr>
-          <p:cNvPr id="3" name="Subtitle 2">
-            <a:extLst>
-              <a:ext uri="{FF2B5EF4-FFF2-40B4-BE49-F238E27FC236}">
-                <a16:creationId xmlns:a16="http://schemas.microsoft.com/office/drawing/2014/main" id="{75F1B0C3-A2F3-4F9A-A853-C3329BFD291A}"/>
-              </a:ext>
-            </a:extLst>
-          </p:cNvPr>
+          <p:cNvPr id="3" name="Subtitle 2"/>
           <p:cNvSpPr>
             <a:spLocks noGrp="1"/>
           </p:cNvSpPr>
@@ -6674,6 +6397,12 @@
               </a:rPr>
               <a:t>For admins:</a:t>
             </a:r>
+            <a:endParaRPr lang="en-GB" sz="1800" dirty="0">
+              <a:effectLst/>
+              <a:latin typeface="Calibri" panose="020F0502020204030204" pitchFamily="34" charset="0"/>
+              <a:ea typeface="Calibri" panose="020F0502020204030204" pitchFamily="34" charset="0"/>
+              <a:cs typeface="Times New Roman" panose="02020603050405020304" pitchFamily="18" charset="0"/>
+            </a:endParaRPr>
           </a:p>
           <a:p>
             <a:pPr marL="285750" indent="-285750" algn="just">
@@ -6695,6 +6424,12 @@
               </a:rPr>
               <a:t>Admins can login by enter username and password or through Facebook </a:t>
             </a:r>
+            <a:endParaRPr lang="en-US" sz="1800" dirty="0">
+              <a:effectLst/>
+              <a:latin typeface="Calibri" panose="020F0502020204030204" pitchFamily="34" charset="0"/>
+              <a:ea typeface="Calibri" panose="020F0502020204030204" pitchFamily="34" charset="0"/>
+              <a:cs typeface="Times New Roman" panose="02020603050405020304" pitchFamily="18" charset="0"/>
+            </a:endParaRPr>
           </a:p>
           <a:p>
             <a:pPr marL="285750" indent="-285750" algn="just">
@@ -6742,6 +6477,12 @@
               </a:rPr>
               <a:t>Manage store owner’s list </a:t>
             </a:r>
+            <a:endParaRPr lang="en-US" sz="1800" dirty="0">
+              <a:effectLst/>
+              <a:latin typeface="Calibri" panose="020F0502020204030204" pitchFamily="34" charset="0"/>
+              <a:ea typeface="Calibri" panose="020F0502020204030204" pitchFamily="34" charset="0"/>
+              <a:cs typeface="Times New Roman" panose="02020603050405020304" pitchFamily="18" charset="0"/>
+            </a:endParaRPr>
           </a:p>
           <a:p>
             <a:pPr marL="285750" indent="-285750" algn="just">
@@ -6800,13 +6541,7 @@
       </p:sp>
       <p:cxnSp>
         <p:nvCxnSpPr>
-          <p:cNvPr id="4" name="Straight Connector 3">
-            <a:extLst>
-              <a:ext uri="{FF2B5EF4-FFF2-40B4-BE49-F238E27FC236}">
-                <a16:creationId xmlns:a16="http://schemas.microsoft.com/office/drawing/2014/main" id="{34520E75-8D82-4BDE-A07E-CEC2A202B5DD}"/>
-              </a:ext>
-            </a:extLst>
-          </p:cNvPr>
+          <p:cNvPr id="4" name="Straight Connector 3"/>
           <p:cNvCxnSpPr/>
           <p:nvPr/>
         </p:nvCxnSpPr>
@@ -6818,7 +6553,6 @@
           <a:prstGeom prst="line">
             <a:avLst/>
           </a:prstGeom>
-          <a:ln/>
         </p:spPr>
         <p:style>
           <a:lnRef idx="2">
@@ -6836,11 +6570,6 @@
         </p:style>
       </p:cxnSp>
     </p:spTree>
-    <p:extLst>
-      <p:ext uri="{BB962C8B-B14F-4D97-AF65-F5344CB8AC3E}">
-        <p14:creationId xmlns:p14="http://schemas.microsoft.com/office/powerpoint/2010/main" val="3161143866"/>
-      </p:ext>
-    </p:extLst>
   </p:cSld>
   <p:clrMapOvr>
     <a:masterClrMapping/>
@@ -6870,13 +6599,7 @@
       </p:grpSpPr>
       <p:sp>
         <p:nvSpPr>
-          <p:cNvPr id="2" name="Title 1">
-            <a:extLst>
-              <a:ext uri="{FF2B5EF4-FFF2-40B4-BE49-F238E27FC236}">
-                <a16:creationId xmlns:a16="http://schemas.microsoft.com/office/drawing/2014/main" id="{33571ED0-74C3-4CC3-A794-54E0AE804E2E}"/>
-              </a:ext>
-            </a:extLst>
-          </p:cNvPr>
+          <p:cNvPr id="2" name="Title 1"/>
           <p:cNvSpPr>
             <a:spLocks noGrp="1"/>
           </p:cNvSpPr>
@@ -6905,13 +6628,7 @@
       </p:sp>
       <p:sp>
         <p:nvSpPr>
-          <p:cNvPr id="3" name="Subtitle 2">
-            <a:extLst>
-              <a:ext uri="{FF2B5EF4-FFF2-40B4-BE49-F238E27FC236}">
-                <a16:creationId xmlns:a16="http://schemas.microsoft.com/office/drawing/2014/main" id="{75F1B0C3-A2F3-4F9A-A853-C3329BFD291A}"/>
-              </a:ext>
-            </a:extLst>
-          </p:cNvPr>
+          <p:cNvPr id="3" name="Subtitle 2"/>
           <p:cNvSpPr>
             <a:spLocks noGrp="1"/>
           </p:cNvSpPr>
@@ -6948,6 +6665,12 @@
               </a:rPr>
               <a:t>For shop owners:</a:t>
             </a:r>
+            <a:endParaRPr lang="en-GB" sz="1800" dirty="0">
+              <a:effectLst/>
+              <a:latin typeface="Calibri" panose="020F0502020204030204" pitchFamily="34" charset="0"/>
+              <a:ea typeface="Calibri" panose="020F0502020204030204" pitchFamily="34" charset="0"/>
+              <a:cs typeface="Times New Roman" panose="02020603050405020304" pitchFamily="18" charset="0"/>
+            </a:endParaRPr>
           </a:p>
           <a:p>
             <a:pPr marL="285750" indent="-285750" algn="just">
@@ -6969,6 +6692,12 @@
               </a:rPr>
               <a:t>Store owners must register an account in order to login. Store owners can register with Username and Password or with Facebook.</a:t>
             </a:r>
+            <a:endParaRPr lang="en-US" sz="1800" dirty="0">
+              <a:effectLst/>
+              <a:latin typeface="Calibri" panose="020F0502020204030204" pitchFamily="34" charset="0"/>
+              <a:ea typeface="Calibri" panose="020F0502020204030204" pitchFamily="34" charset="0"/>
+              <a:cs typeface="Times New Roman" panose="02020603050405020304" pitchFamily="18" charset="0"/>
+            </a:endParaRPr>
           </a:p>
           <a:p>
             <a:pPr marL="285750" indent="-285750" algn="just">
@@ -7016,6 +6745,12 @@
               </a:rPr>
               <a:t>Store owners can create a new product to showcase or edit or delete the services that their store already has on the system.</a:t>
             </a:r>
+            <a:endParaRPr lang="en-US" sz="1800" dirty="0">
+              <a:effectLst/>
+              <a:latin typeface="Calibri" panose="020F0502020204030204" pitchFamily="34" charset="0"/>
+              <a:ea typeface="Calibri" panose="020F0502020204030204" pitchFamily="34" charset="0"/>
+              <a:cs typeface="Times New Roman" panose="02020603050405020304" pitchFamily="18" charset="0"/>
+            </a:endParaRPr>
           </a:p>
           <a:p>
             <a:pPr marL="285750" indent="-285750" algn="just">
@@ -7036,18 +6771,17 @@
               </a:rPr>
               <a:t>Store owners can view rate and comment of users.</a:t>
             </a:r>
+            <a:endParaRPr lang="en-US" sz="1800" dirty="0">
+              <a:latin typeface="Calibri" panose="020F0502020204030204" pitchFamily="34" charset="0"/>
+              <a:ea typeface="Calibri" panose="020F0502020204030204" pitchFamily="34" charset="0"/>
+              <a:cs typeface="Times New Roman" panose="02020603050405020304" pitchFamily="18" charset="0"/>
+            </a:endParaRPr>
           </a:p>
         </p:txBody>
       </p:sp>
       <p:cxnSp>
         <p:nvCxnSpPr>
-          <p:cNvPr id="4" name="Straight Connector 3">
-            <a:extLst>
-              <a:ext uri="{FF2B5EF4-FFF2-40B4-BE49-F238E27FC236}">
-                <a16:creationId xmlns:a16="http://schemas.microsoft.com/office/drawing/2014/main" id="{34520E75-8D82-4BDE-A07E-CEC2A202B5DD}"/>
-              </a:ext>
-            </a:extLst>
-          </p:cNvPr>
+          <p:cNvPr id="4" name="Straight Connector 3"/>
           <p:cNvCxnSpPr/>
           <p:nvPr/>
         </p:nvCxnSpPr>
@@ -7059,7 +6793,6 @@
           <a:prstGeom prst="line">
             <a:avLst/>
           </a:prstGeom>
-          <a:ln/>
         </p:spPr>
         <p:style>
           <a:lnRef idx="2">
@@ -7077,11 +6810,6 @@
         </p:style>
       </p:cxnSp>
     </p:spTree>
-    <p:extLst>
-      <p:ext uri="{BB962C8B-B14F-4D97-AF65-F5344CB8AC3E}">
-        <p14:creationId xmlns:p14="http://schemas.microsoft.com/office/powerpoint/2010/main" val="62578386"/>
-      </p:ext>
-    </p:extLst>
   </p:cSld>
   <p:clrMapOvr>
     <a:masterClrMapping/>
@@ -7135,7 +6863,7 @@
     </a:clrScheme>
     <a:fontScheme name="Crop">
       <a:majorFont>
-        <a:latin typeface="Franklin Gothic Book" panose="020B0503020102020204"/>
+        <a:latin typeface="Franklin Gothic Book"/>
         <a:ea typeface=""/>
         <a:cs typeface=""/>
         <a:font script="Jpan" typeface="メイリオ"/>
@@ -7170,7 +6898,7 @@
         <a:font script="Geor" typeface="Sylfaen"/>
       </a:majorFont>
       <a:minorFont>
-        <a:latin typeface="Franklin Gothic Book" panose="020B0503020102020204"/>
+        <a:latin typeface="Franklin Gothic Book"/>
         <a:ea typeface=""/>
         <a:cs typeface=""/>
         <a:font script="Jpan" typeface="メイリオ"/>
@@ -7340,11 +7068,9 @@
       </a:bgFillStyleLst>
     </a:fmtScheme>
   </a:themeElements>
-  <a:objectDefaults/>
-  <a:extraClrSchemeLst/>
   <a:extLst>
     <a:ext uri="{05A4C25C-085E-4340-85A3-A5531E510DB2}">
-      <thm15:themeFamily xmlns:thm15="http://schemas.microsoft.com/office/thememl/2012/main" name="Crop" id="{EC9488ED-E761-4D60-9AC4-764D1FE2C171}" vid="{CE19780C-D67D-4C13-9DE9-A52BC3BA51B4}"/>
+      <thm15:themeFamily xmlns:thm15="http://schemas.microsoft.com/office/thememl/2012/main" name="Office Theme" id="{62F939B6-93AF-4DB8-9C6B-D6C7DFDC589F}" vid="{4A3C46E8-61CC-4603-A589-7422A47A8E4A}"/>
     </a:ext>
   </a:extLst>
 </a:theme>

</xml_diff>